<commit_message>
Use command en control to control possible commands
</commit_message>
<xml_diff>
--- a/res/roadmap/roadmap.pptx
+++ b/res/roadmap/roadmap.pptx
@@ -5,7 +5,10 @@
     <p:sldMasterId id="2147483648" r:id="rId1"/>
   </p:sldMasterIdLst>
   <p:sldIdLst>
-    <p:sldId id="256" r:id="rId2"/>
+    <p:sldId id="257" r:id="rId2"/>
+    <p:sldId id="258" r:id="rId3"/>
+    <p:sldId id="259" r:id="rId4"/>
+    <p:sldId id="256" r:id="rId5"/>
   </p:sldIdLst>
   <p:sldSz cx="12192000" cy="6858000"/>
   <p:notesSz cx="6858000" cy="9144000"/>
@@ -259,7 +262,7 @@
           <a:p>
             <a:fld id="{4ABBE553-3039-4557-964A-51FE74F64587}" type="datetimeFigureOut">
               <a:rPr lang="de-DE" smtClean="0"/>
-              <a:t>25.02.2022</a:t>
+              <a:t>14.03.2022</a:t>
             </a:fld>
             <a:endParaRPr lang="de-DE"/>
           </a:p>
@@ -457,7 +460,7 @@
           <a:p>
             <a:fld id="{4ABBE553-3039-4557-964A-51FE74F64587}" type="datetimeFigureOut">
               <a:rPr lang="de-DE" smtClean="0"/>
-              <a:t>25.02.2022</a:t>
+              <a:t>14.03.2022</a:t>
             </a:fld>
             <a:endParaRPr lang="de-DE"/>
           </a:p>
@@ -665,7 +668,7 @@
           <a:p>
             <a:fld id="{4ABBE553-3039-4557-964A-51FE74F64587}" type="datetimeFigureOut">
               <a:rPr lang="de-DE" smtClean="0"/>
-              <a:t>25.02.2022</a:t>
+              <a:t>14.03.2022</a:t>
             </a:fld>
             <a:endParaRPr lang="de-DE"/>
           </a:p>
@@ -863,7 +866,7 @@
           <a:p>
             <a:fld id="{4ABBE553-3039-4557-964A-51FE74F64587}" type="datetimeFigureOut">
               <a:rPr lang="de-DE" smtClean="0"/>
-              <a:t>25.02.2022</a:t>
+              <a:t>14.03.2022</a:t>
             </a:fld>
             <a:endParaRPr lang="de-DE"/>
           </a:p>
@@ -1138,7 +1141,7 @@
           <a:p>
             <a:fld id="{4ABBE553-3039-4557-964A-51FE74F64587}" type="datetimeFigureOut">
               <a:rPr lang="de-DE" smtClean="0"/>
-              <a:t>25.02.2022</a:t>
+              <a:t>14.03.2022</a:t>
             </a:fld>
             <a:endParaRPr lang="de-DE"/>
           </a:p>
@@ -1403,7 +1406,7 @@
           <a:p>
             <a:fld id="{4ABBE553-3039-4557-964A-51FE74F64587}" type="datetimeFigureOut">
               <a:rPr lang="de-DE" smtClean="0"/>
-              <a:t>25.02.2022</a:t>
+              <a:t>14.03.2022</a:t>
             </a:fld>
             <a:endParaRPr lang="de-DE"/>
           </a:p>
@@ -1815,7 +1818,7 @@
           <a:p>
             <a:fld id="{4ABBE553-3039-4557-964A-51FE74F64587}" type="datetimeFigureOut">
               <a:rPr lang="de-DE" smtClean="0"/>
-              <a:t>25.02.2022</a:t>
+              <a:t>14.03.2022</a:t>
             </a:fld>
             <a:endParaRPr lang="de-DE"/>
           </a:p>
@@ -1956,7 +1959,7 @@
           <a:p>
             <a:fld id="{4ABBE553-3039-4557-964A-51FE74F64587}" type="datetimeFigureOut">
               <a:rPr lang="de-DE" smtClean="0"/>
-              <a:t>25.02.2022</a:t>
+              <a:t>14.03.2022</a:t>
             </a:fld>
             <a:endParaRPr lang="de-DE"/>
           </a:p>
@@ -2069,7 +2072,7 @@
           <a:p>
             <a:fld id="{4ABBE553-3039-4557-964A-51FE74F64587}" type="datetimeFigureOut">
               <a:rPr lang="de-DE" smtClean="0"/>
-              <a:t>25.02.2022</a:t>
+              <a:t>14.03.2022</a:t>
             </a:fld>
             <a:endParaRPr lang="de-DE"/>
           </a:p>
@@ -2380,7 +2383,7 @@
           <a:p>
             <a:fld id="{4ABBE553-3039-4557-964A-51FE74F64587}" type="datetimeFigureOut">
               <a:rPr lang="de-DE" smtClean="0"/>
-              <a:t>25.02.2022</a:t>
+              <a:t>14.03.2022</a:t>
             </a:fld>
             <a:endParaRPr lang="de-DE"/>
           </a:p>
@@ -2668,7 +2671,7 @@
           <a:p>
             <a:fld id="{4ABBE553-3039-4557-964A-51FE74F64587}" type="datetimeFigureOut">
               <a:rPr lang="de-DE" smtClean="0"/>
-              <a:t>25.02.2022</a:t>
+              <a:t>14.03.2022</a:t>
             </a:fld>
             <a:endParaRPr lang="de-DE"/>
           </a:p>
@@ -2909,7 +2912,7 @@
           <a:p>
             <a:fld id="{4ABBE553-3039-4557-964A-51FE74F64587}" type="datetimeFigureOut">
               <a:rPr lang="de-DE" smtClean="0"/>
-              <a:t>25.02.2022</a:t>
+              <a:t>14.03.2022</a:t>
             </a:fld>
             <a:endParaRPr lang="de-DE"/>
           </a:p>
@@ -3326,6 +3329,2708 @@
           <a:chExt cx="0" cy="0"/>
         </a:xfrm>
       </p:grpSpPr>
+      <p:sp>
+        <p:nvSpPr>
+          <p:cNvPr id="2" name="Titel 1">
+            <a:extLst>
+              <a:ext uri="{FF2B5EF4-FFF2-40B4-BE49-F238E27FC236}">
+                <a16:creationId xmlns:a16="http://schemas.microsoft.com/office/drawing/2014/main" id="{0626B014-0D4C-407D-ACDA-16BE621551FC}"/>
+              </a:ext>
+            </a:extLst>
+          </p:cNvPr>
+          <p:cNvSpPr>
+            <a:spLocks noGrp="1"/>
+          </p:cNvSpPr>
+          <p:nvPr>
+            <p:ph type="title"/>
+          </p:nvPr>
+        </p:nvSpPr>
+        <p:spPr/>
+        <p:txBody>
+          <a:bodyPr/>
+          <a:lstStyle/>
+          <a:p>
+            <a:r>
+              <a:rPr lang="de-DE" dirty="0" err="1"/>
+              <a:t>MTPPy</a:t>
+            </a:r>
+            <a:endParaRPr lang="de-DE" dirty="0"/>
+          </a:p>
+        </p:txBody>
+      </p:sp>
+      <p:sp>
+        <p:nvSpPr>
+          <p:cNvPr id="3" name="Inhaltsplatzhalter 2">
+            <a:extLst>
+              <a:ext uri="{FF2B5EF4-FFF2-40B4-BE49-F238E27FC236}">
+                <a16:creationId xmlns:a16="http://schemas.microsoft.com/office/drawing/2014/main" id="{DAAEF1B3-98D1-4248-B6A6-F8E74D9BB9B0}"/>
+              </a:ext>
+            </a:extLst>
+          </p:cNvPr>
+          <p:cNvSpPr>
+            <a:spLocks noGrp="1"/>
+          </p:cNvSpPr>
+          <p:nvPr>
+            <p:ph idx="1"/>
+          </p:nvPr>
+        </p:nvSpPr>
+        <p:spPr/>
+        <p:txBody>
+          <a:bodyPr/>
+          <a:lstStyle/>
+          <a:p>
+            <a:r>
+              <a:rPr lang="de-DE" dirty="0"/>
+              <a:t>Python </a:t>
+            </a:r>
+            <a:r>
+              <a:rPr lang="de-DE" dirty="0" err="1"/>
+              <a:t>package</a:t>
+            </a:r>
+            <a:r>
+              <a:rPr lang="de-DE" dirty="0"/>
+              <a:t> </a:t>
+            </a:r>
+            <a:r>
+              <a:rPr lang="de-DE" dirty="0" err="1"/>
+              <a:t>for</a:t>
+            </a:r>
+            <a:r>
+              <a:rPr lang="de-DE" dirty="0"/>
+              <a:t> modular </a:t>
+            </a:r>
+            <a:r>
+              <a:rPr lang="de-DE" dirty="0" err="1"/>
+              <a:t>automation</a:t>
+            </a:r>
+            <a:endParaRPr lang="de-DE" dirty="0"/>
+          </a:p>
+          <a:p>
+            <a:r>
+              <a:rPr lang="de-DE" dirty="0"/>
+              <a:t>Fully </a:t>
+            </a:r>
+            <a:r>
+              <a:rPr lang="de-DE" dirty="0" err="1"/>
+              <a:t>written</a:t>
+            </a:r>
+            <a:r>
+              <a:rPr lang="de-DE" dirty="0"/>
+              <a:t> in Python, open source and </a:t>
+            </a:r>
+            <a:r>
+              <a:rPr lang="de-DE" dirty="0" err="1"/>
+              <a:t>free</a:t>
+            </a:r>
+            <a:r>
+              <a:rPr lang="de-DE" dirty="0"/>
+              <a:t> </a:t>
+            </a:r>
+            <a:r>
+              <a:rPr lang="de-DE" dirty="0" err="1"/>
+              <a:t>to</a:t>
+            </a:r>
+            <a:r>
+              <a:rPr lang="de-DE" dirty="0"/>
+              <a:t> </a:t>
+            </a:r>
+            <a:r>
+              <a:rPr lang="de-DE" dirty="0" err="1"/>
+              <a:t>use</a:t>
+            </a:r>
+            <a:endParaRPr lang="de-DE" dirty="0"/>
+          </a:p>
+          <a:p>
+            <a:r>
+              <a:rPr lang="de-DE" dirty="0"/>
+              <a:t>AI-</a:t>
+            </a:r>
+            <a:r>
+              <a:rPr lang="de-DE" dirty="0" err="1"/>
+              <a:t>ready</a:t>
+            </a:r>
+            <a:r>
+              <a:rPr lang="de-DE" dirty="0"/>
+              <a:t> and </a:t>
+            </a:r>
+            <a:r>
+              <a:rPr lang="de-DE" dirty="0" err="1"/>
+              <a:t>cross-platform</a:t>
+            </a:r>
+            <a:r>
+              <a:rPr lang="de-DE" dirty="0"/>
+              <a:t> (</a:t>
+            </a:r>
+            <a:r>
+              <a:rPr lang="de-DE" dirty="0" err="1"/>
+              <a:t>tested</a:t>
+            </a:r>
+            <a:r>
+              <a:rPr lang="de-DE" dirty="0"/>
+              <a:t> on x64, arm64)</a:t>
+            </a:r>
+          </a:p>
+          <a:p>
+            <a:r>
+              <a:rPr lang="de-DE" dirty="0" err="1"/>
+              <a:t>Based</a:t>
+            </a:r>
+            <a:r>
+              <a:rPr lang="de-DE" dirty="0"/>
+              <a:t> on </a:t>
+            </a:r>
+            <a:r>
+              <a:rPr lang="de-DE" dirty="0" err="1"/>
+              <a:t>python-opcua</a:t>
+            </a:r>
+            <a:r>
+              <a:rPr lang="de-DE" dirty="0"/>
+              <a:t> </a:t>
+            </a:r>
+            <a:r>
+              <a:rPr lang="de-DE" dirty="0" err="1"/>
+              <a:t>for</a:t>
+            </a:r>
+            <a:r>
+              <a:rPr lang="de-DE" dirty="0"/>
+              <a:t> </a:t>
+            </a:r>
+            <a:r>
+              <a:rPr lang="de-DE" dirty="0" err="1"/>
+              <a:t>opcua</a:t>
+            </a:r>
+            <a:r>
+              <a:rPr lang="de-DE" dirty="0"/>
+              <a:t> </a:t>
+            </a:r>
+            <a:r>
+              <a:rPr lang="de-DE" dirty="0" err="1"/>
+              <a:t>connectivity</a:t>
+            </a:r>
+            <a:endParaRPr lang="de-DE" dirty="0"/>
+          </a:p>
+          <a:p>
+            <a:r>
+              <a:rPr lang="de-DE" dirty="0" err="1"/>
+              <a:t>Developed</a:t>
+            </a:r>
+            <a:r>
+              <a:rPr lang="de-DE" dirty="0"/>
+              <a:t> </a:t>
+            </a:r>
+            <a:r>
+              <a:rPr lang="de-DE" dirty="0" err="1"/>
+              <a:t>by</a:t>
+            </a:r>
+            <a:r>
+              <a:rPr lang="de-DE" dirty="0"/>
+              <a:t> TUD and </a:t>
+            </a:r>
+            <a:r>
+              <a:rPr lang="de-DE" dirty="0" err="1"/>
+              <a:t>TUDo</a:t>
+            </a:r>
+            <a:endParaRPr lang="de-DE" dirty="0"/>
+          </a:p>
+          <a:p>
+            <a:r>
+              <a:rPr lang="de-DE" dirty="0"/>
+              <a:t>Can </a:t>
+            </a:r>
+            <a:r>
+              <a:rPr lang="de-DE" dirty="0" err="1"/>
+              <a:t>be</a:t>
+            </a:r>
+            <a:r>
+              <a:rPr lang="de-DE" dirty="0"/>
+              <a:t> </a:t>
+            </a:r>
+            <a:r>
+              <a:rPr lang="de-DE" dirty="0" err="1"/>
+              <a:t>downloaded</a:t>
+            </a:r>
+            <a:r>
+              <a:rPr lang="de-DE" dirty="0"/>
+              <a:t> via https://pypi.org/project/MTPPy/</a:t>
+            </a:r>
+          </a:p>
+          <a:p>
+            <a:endParaRPr lang="de-DE" dirty="0"/>
+          </a:p>
+        </p:txBody>
+      </p:sp>
+    </p:spTree>
+    <p:extLst>
+      <p:ext uri="{BB962C8B-B14F-4D97-AF65-F5344CB8AC3E}">
+        <p14:creationId xmlns:p14="http://schemas.microsoft.com/office/powerpoint/2010/main" val="2731063146"/>
+      </p:ext>
+    </p:extLst>
+  </p:cSld>
+  <p:clrMapOvr>
+    <a:masterClrMapping/>
+  </p:clrMapOvr>
+</p:sld>
+</file>
+
+<file path=ppt/slides/slide2.xml><?xml version="1.0" encoding="utf-8"?>
+<p:sld xmlns:a="http://schemas.openxmlformats.org/drawingml/2006/main" xmlns:r="http://schemas.openxmlformats.org/officeDocument/2006/relationships" xmlns:p="http://schemas.openxmlformats.org/presentationml/2006/main">
+  <p:cSld>
+    <p:spTree>
+      <p:nvGrpSpPr>
+        <p:cNvPr id="1" name=""/>
+        <p:cNvGrpSpPr/>
+        <p:nvPr/>
+      </p:nvGrpSpPr>
+      <p:grpSpPr>
+        <a:xfrm>
+          <a:off x="0" y="0"/>
+          <a:ext cx="0" cy="0"/>
+          <a:chOff x="0" y="0"/>
+          <a:chExt cx="0" cy="0"/>
+        </a:xfrm>
+      </p:grpSpPr>
+      <p:sp>
+        <p:nvSpPr>
+          <p:cNvPr id="2" name="Titel 1">
+            <a:extLst>
+              <a:ext uri="{FF2B5EF4-FFF2-40B4-BE49-F238E27FC236}">
+                <a16:creationId xmlns:a16="http://schemas.microsoft.com/office/drawing/2014/main" id="{A45D0508-2363-4D05-AB94-0CEB4D46EA02}"/>
+              </a:ext>
+            </a:extLst>
+          </p:cNvPr>
+          <p:cNvSpPr>
+            <a:spLocks noGrp="1"/>
+          </p:cNvSpPr>
+          <p:nvPr>
+            <p:ph type="title"/>
+          </p:nvPr>
+        </p:nvSpPr>
+        <p:spPr/>
+        <p:txBody>
+          <a:bodyPr/>
+          <a:lstStyle/>
+          <a:p>
+            <a:r>
+              <a:rPr lang="de-DE" dirty="0" err="1"/>
+              <a:t>MTPPy</a:t>
+            </a:r>
+            <a:endParaRPr lang="de-DE" dirty="0"/>
+          </a:p>
+        </p:txBody>
+      </p:sp>
+      <p:sp>
+        <p:nvSpPr>
+          <p:cNvPr id="5" name="Textfeld 4">
+            <a:extLst>
+              <a:ext uri="{FF2B5EF4-FFF2-40B4-BE49-F238E27FC236}">
+                <a16:creationId xmlns:a16="http://schemas.microsoft.com/office/drawing/2014/main" id="{80FFC6CE-BDB6-4D9A-AEAF-AED5E7933E73}"/>
+              </a:ext>
+            </a:extLst>
+          </p:cNvPr>
+          <p:cNvSpPr txBox="1"/>
+          <p:nvPr/>
+        </p:nvSpPr>
+        <p:spPr>
+          <a:xfrm>
+            <a:off x="987564" y="1701832"/>
+            <a:ext cx="4625637" cy="923330"/>
+          </a:xfrm>
+          <a:prstGeom prst="rect">
+            <a:avLst/>
+          </a:prstGeom>
+          <a:noFill/>
+        </p:spPr>
+        <p:txBody>
+          <a:bodyPr wrap="square" rtlCol="0">
+            <a:spAutoFit/>
+          </a:bodyPr>
+          <a:lstStyle/>
+          <a:p>
+            <a:r>
+              <a:rPr lang="de-DE" dirty="0"/>
+              <a:t>Scenario 1: virtual </a:t>
+            </a:r>
+            <a:r>
+              <a:rPr lang="de-DE" dirty="0" err="1"/>
+              <a:t>module</a:t>
+            </a:r>
+            <a:endParaRPr lang="de-DE" dirty="0"/>
+          </a:p>
+          <a:p>
+            <a:pPr marL="285750" indent="-285750">
+              <a:buFont typeface="Arial" panose="020B0604020202020204" pitchFamily="34" charset="0"/>
+              <a:buChar char="•"/>
+            </a:pPr>
+            <a:r>
+              <a:rPr lang="de-DE" dirty="0" err="1"/>
+              <a:t>No</a:t>
+            </a:r>
+            <a:r>
+              <a:rPr lang="de-DE" dirty="0"/>
+              <a:t> </a:t>
+            </a:r>
+            <a:r>
+              <a:rPr lang="de-DE" dirty="0" err="1"/>
+              <a:t>direct</a:t>
+            </a:r>
+            <a:r>
+              <a:rPr lang="de-DE" dirty="0"/>
+              <a:t> </a:t>
+            </a:r>
+            <a:r>
+              <a:rPr lang="de-DE" dirty="0" err="1"/>
+              <a:t>connections</a:t>
+            </a:r>
+            <a:r>
+              <a:rPr lang="de-DE" dirty="0"/>
+              <a:t> </a:t>
+            </a:r>
+            <a:r>
+              <a:rPr lang="de-DE" dirty="0" err="1"/>
+              <a:t>to</a:t>
+            </a:r>
+            <a:r>
+              <a:rPr lang="de-DE" dirty="0"/>
+              <a:t> </a:t>
+            </a:r>
+            <a:r>
+              <a:rPr lang="de-DE" dirty="0" err="1"/>
+              <a:t>field</a:t>
+            </a:r>
+            <a:r>
+              <a:rPr lang="de-DE" dirty="0"/>
+              <a:t> </a:t>
+            </a:r>
+            <a:r>
+              <a:rPr lang="de-DE" dirty="0" err="1"/>
+              <a:t>devices</a:t>
+            </a:r>
+            <a:endParaRPr lang="de-DE" dirty="0"/>
+          </a:p>
+          <a:p>
+            <a:pPr marL="285750" indent="-285750">
+              <a:buFont typeface="Arial" panose="020B0604020202020204" pitchFamily="34" charset="0"/>
+              <a:buChar char="•"/>
+            </a:pPr>
+            <a:r>
+              <a:rPr lang="de-DE" dirty="0" err="1"/>
+              <a:t>For</a:t>
+            </a:r>
+            <a:r>
+              <a:rPr lang="de-DE" dirty="0"/>
+              <a:t> virtual/soft </a:t>
+            </a:r>
+            <a:r>
+              <a:rPr lang="de-DE" dirty="0" err="1"/>
+              <a:t>sensors</a:t>
+            </a:r>
+            <a:endParaRPr lang="de-DE" dirty="0"/>
+          </a:p>
+        </p:txBody>
+      </p:sp>
+      <p:sp>
+        <p:nvSpPr>
+          <p:cNvPr id="37" name="Rechteck 36">
+            <a:extLst>
+              <a:ext uri="{FF2B5EF4-FFF2-40B4-BE49-F238E27FC236}">
+                <a16:creationId xmlns:a16="http://schemas.microsoft.com/office/drawing/2014/main" id="{09ED4691-40F3-4E35-9263-A0A4E3230555}"/>
+              </a:ext>
+            </a:extLst>
+          </p:cNvPr>
+          <p:cNvSpPr/>
+          <p:nvPr/>
+        </p:nvSpPr>
+        <p:spPr>
+          <a:xfrm>
+            <a:off x="987564" y="3246024"/>
+            <a:ext cx="4625637" cy="676656"/>
+          </a:xfrm>
+          <a:prstGeom prst="rect">
+            <a:avLst/>
+          </a:prstGeom>
+        </p:spPr>
+        <p:style>
+          <a:lnRef idx="2">
+            <a:schemeClr val="accent1">
+              <a:shade val="50000"/>
+            </a:schemeClr>
+          </a:lnRef>
+          <a:fillRef idx="1">
+            <a:schemeClr val="accent1"/>
+          </a:fillRef>
+          <a:effectRef idx="0">
+            <a:schemeClr val="accent1"/>
+          </a:effectRef>
+          <a:fontRef idx="minor">
+            <a:schemeClr val="lt1"/>
+          </a:fontRef>
+        </p:style>
+        <p:txBody>
+          <a:bodyPr rtlCol="0" anchor="ctr"/>
+          <a:lstStyle/>
+          <a:p>
+            <a:pPr algn="ctr"/>
+            <a:r>
+              <a:rPr lang="de-DE" dirty="0" err="1"/>
+              <a:t>Process</a:t>
+            </a:r>
+            <a:r>
+              <a:rPr lang="de-DE" dirty="0"/>
+              <a:t> Orchestration Layer</a:t>
+            </a:r>
+          </a:p>
+        </p:txBody>
+      </p:sp>
+      <p:sp>
+        <p:nvSpPr>
+          <p:cNvPr id="38" name="Rechteck 37">
+            <a:extLst>
+              <a:ext uri="{FF2B5EF4-FFF2-40B4-BE49-F238E27FC236}">
+                <a16:creationId xmlns:a16="http://schemas.microsoft.com/office/drawing/2014/main" id="{728B3BA5-E145-4C43-998E-5C3337D3C7F6}"/>
+              </a:ext>
+            </a:extLst>
+          </p:cNvPr>
+          <p:cNvSpPr/>
+          <p:nvPr/>
+        </p:nvSpPr>
+        <p:spPr>
+          <a:xfrm>
+            <a:off x="987565" y="4413408"/>
+            <a:ext cx="1363064" cy="676656"/>
+          </a:xfrm>
+          <a:prstGeom prst="rect">
+            <a:avLst/>
+          </a:prstGeom>
+        </p:spPr>
+        <p:style>
+          <a:lnRef idx="2">
+            <a:schemeClr val="accent1">
+              <a:shade val="50000"/>
+            </a:schemeClr>
+          </a:lnRef>
+          <a:fillRef idx="1">
+            <a:schemeClr val="accent1"/>
+          </a:fillRef>
+          <a:effectRef idx="0">
+            <a:schemeClr val="accent1"/>
+          </a:effectRef>
+          <a:fontRef idx="minor">
+            <a:schemeClr val="lt1"/>
+          </a:fontRef>
+        </p:style>
+        <p:txBody>
+          <a:bodyPr rtlCol="0" anchor="ctr"/>
+          <a:lstStyle/>
+          <a:p>
+            <a:pPr algn="ctr"/>
+            <a:r>
+              <a:rPr lang="de-DE" dirty="0"/>
+              <a:t>PEA 1</a:t>
+            </a:r>
+          </a:p>
+          <a:p>
+            <a:pPr algn="ctr"/>
+            <a:r>
+              <a:rPr lang="de-DE" dirty="0"/>
+              <a:t>on PLC</a:t>
+            </a:r>
+          </a:p>
+        </p:txBody>
+      </p:sp>
+      <p:sp>
+        <p:nvSpPr>
+          <p:cNvPr id="39" name="Rechteck 38">
+            <a:extLst>
+              <a:ext uri="{FF2B5EF4-FFF2-40B4-BE49-F238E27FC236}">
+                <a16:creationId xmlns:a16="http://schemas.microsoft.com/office/drawing/2014/main" id="{DD79D1A7-2E11-4FFB-93D3-B34C4663F8D5}"/>
+              </a:ext>
+            </a:extLst>
+          </p:cNvPr>
+          <p:cNvSpPr/>
+          <p:nvPr/>
+        </p:nvSpPr>
+        <p:spPr>
+          <a:xfrm>
+            <a:off x="2634089" y="4413408"/>
+            <a:ext cx="1363064" cy="676656"/>
+          </a:xfrm>
+          <a:prstGeom prst="rect">
+            <a:avLst/>
+          </a:prstGeom>
+        </p:spPr>
+        <p:style>
+          <a:lnRef idx="2">
+            <a:schemeClr val="accent1">
+              <a:shade val="50000"/>
+            </a:schemeClr>
+          </a:lnRef>
+          <a:fillRef idx="1">
+            <a:schemeClr val="accent1"/>
+          </a:fillRef>
+          <a:effectRef idx="0">
+            <a:schemeClr val="accent1"/>
+          </a:effectRef>
+          <a:fontRef idx="minor">
+            <a:schemeClr val="lt1"/>
+          </a:fontRef>
+        </p:style>
+        <p:txBody>
+          <a:bodyPr rtlCol="0" anchor="ctr"/>
+          <a:lstStyle/>
+          <a:p>
+            <a:pPr algn="ctr"/>
+            <a:r>
+              <a:rPr lang="de-DE" dirty="0"/>
+              <a:t>PEA 2</a:t>
+            </a:r>
+          </a:p>
+          <a:p>
+            <a:pPr algn="ctr"/>
+            <a:r>
+              <a:rPr lang="de-DE" dirty="0" err="1"/>
+              <a:t>MTPPy</a:t>
+            </a:r>
+            <a:endParaRPr lang="de-DE" dirty="0"/>
+          </a:p>
+        </p:txBody>
+      </p:sp>
+      <p:sp>
+        <p:nvSpPr>
+          <p:cNvPr id="40" name="Rechteck 39">
+            <a:extLst>
+              <a:ext uri="{FF2B5EF4-FFF2-40B4-BE49-F238E27FC236}">
+                <a16:creationId xmlns:a16="http://schemas.microsoft.com/office/drawing/2014/main" id="{D9902CC9-B691-457C-97A4-458BBA5F6658}"/>
+              </a:ext>
+            </a:extLst>
+          </p:cNvPr>
+          <p:cNvSpPr/>
+          <p:nvPr/>
+        </p:nvSpPr>
+        <p:spPr>
+          <a:xfrm>
+            <a:off x="4250137" y="4413408"/>
+            <a:ext cx="1363064" cy="676656"/>
+          </a:xfrm>
+          <a:prstGeom prst="rect">
+            <a:avLst/>
+          </a:prstGeom>
+        </p:spPr>
+        <p:style>
+          <a:lnRef idx="2">
+            <a:schemeClr val="accent1">
+              <a:shade val="50000"/>
+            </a:schemeClr>
+          </a:lnRef>
+          <a:fillRef idx="1">
+            <a:schemeClr val="accent1"/>
+          </a:fillRef>
+          <a:effectRef idx="0">
+            <a:schemeClr val="accent1"/>
+          </a:effectRef>
+          <a:fontRef idx="minor">
+            <a:schemeClr val="lt1"/>
+          </a:fontRef>
+        </p:style>
+        <p:txBody>
+          <a:bodyPr rtlCol="0" anchor="ctr"/>
+          <a:lstStyle/>
+          <a:p>
+            <a:pPr algn="ctr"/>
+            <a:r>
+              <a:rPr lang="de-DE" dirty="0"/>
+              <a:t>PEA 3</a:t>
+            </a:r>
+          </a:p>
+          <a:p>
+            <a:pPr algn="ctr"/>
+            <a:r>
+              <a:rPr lang="de-DE" dirty="0"/>
+              <a:t>on PLC</a:t>
+            </a:r>
+          </a:p>
+        </p:txBody>
+      </p:sp>
+      <p:sp>
+        <p:nvSpPr>
+          <p:cNvPr id="41" name="Rechteck 40">
+            <a:extLst>
+              <a:ext uri="{FF2B5EF4-FFF2-40B4-BE49-F238E27FC236}">
+                <a16:creationId xmlns:a16="http://schemas.microsoft.com/office/drawing/2014/main" id="{33B77009-C81B-4DB3-98D3-F3493AFD2227}"/>
+              </a:ext>
+            </a:extLst>
+          </p:cNvPr>
+          <p:cNvSpPr/>
+          <p:nvPr/>
+        </p:nvSpPr>
+        <p:spPr>
+          <a:xfrm>
+            <a:off x="987565" y="5580792"/>
+            <a:ext cx="1363064" cy="676656"/>
+          </a:xfrm>
+          <a:prstGeom prst="rect">
+            <a:avLst/>
+          </a:prstGeom>
+        </p:spPr>
+        <p:style>
+          <a:lnRef idx="2">
+            <a:schemeClr val="accent1">
+              <a:shade val="50000"/>
+            </a:schemeClr>
+          </a:lnRef>
+          <a:fillRef idx="1">
+            <a:schemeClr val="accent1"/>
+          </a:fillRef>
+          <a:effectRef idx="0">
+            <a:schemeClr val="accent1"/>
+          </a:effectRef>
+          <a:fontRef idx="minor">
+            <a:schemeClr val="lt1"/>
+          </a:fontRef>
+        </p:style>
+        <p:txBody>
+          <a:bodyPr rtlCol="0" anchor="ctr"/>
+          <a:lstStyle/>
+          <a:p>
+            <a:pPr algn="ctr"/>
+            <a:r>
+              <a:rPr lang="de-DE" dirty="0"/>
+              <a:t>Field </a:t>
+            </a:r>
+            <a:r>
+              <a:rPr lang="de-DE" dirty="0" err="1"/>
+              <a:t>devices</a:t>
+            </a:r>
+            <a:endParaRPr lang="de-DE" dirty="0"/>
+          </a:p>
+        </p:txBody>
+      </p:sp>
+      <p:sp>
+        <p:nvSpPr>
+          <p:cNvPr id="42" name="Rechteck 41">
+            <a:extLst>
+              <a:ext uri="{FF2B5EF4-FFF2-40B4-BE49-F238E27FC236}">
+                <a16:creationId xmlns:a16="http://schemas.microsoft.com/office/drawing/2014/main" id="{13E9C653-B7A9-4B0B-8AC6-DC62EFEE65B9}"/>
+              </a:ext>
+            </a:extLst>
+          </p:cNvPr>
+          <p:cNvSpPr/>
+          <p:nvPr/>
+        </p:nvSpPr>
+        <p:spPr>
+          <a:xfrm>
+            <a:off x="4250137" y="5580792"/>
+            <a:ext cx="1363064" cy="676656"/>
+          </a:xfrm>
+          <a:prstGeom prst="rect">
+            <a:avLst/>
+          </a:prstGeom>
+        </p:spPr>
+        <p:style>
+          <a:lnRef idx="2">
+            <a:schemeClr val="accent1">
+              <a:shade val="50000"/>
+            </a:schemeClr>
+          </a:lnRef>
+          <a:fillRef idx="1">
+            <a:schemeClr val="accent1"/>
+          </a:fillRef>
+          <a:effectRef idx="0">
+            <a:schemeClr val="accent1"/>
+          </a:effectRef>
+          <a:fontRef idx="minor">
+            <a:schemeClr val="lt1"/>
+          </a:fontRef>
+        </p:style>
+        <p:txBody>
+          <a:bodyPr rtlCol="0" anchor="ctr"/>
+          <a:lstStyle/>
+          <a:p>
+            <a:pPr algn="ctr"/>
+            <a:r>
+              <a:rPr lang="de-DE" dirty="0"/>
+              <a:t>Field </a:t>
+            </a:r>
+            <a:r>
+              <a:rPr lang="de-DE" dirty="0" err="1"/>
+              <a:t>devices</a:t>
+            </a:r>
+            <a:endParaRPr lang="de-DE" dirty="0"/>
+          </a:p>
+        </p:txBody>
+      </p:sp>
+      <p:cxnSp>
+        <p:nvCxnSpPr>
+          <p:cNvPr id="43" name="Gerade Verbindung mit Pfeil 42">
+            <a:extLst>
+              <a:ext uri="{FF2B5EF4-FFF2-40B4-BE49-F238E27FC236}">
+                <a16:creationId xmlns:a16="http://schemas.microsoft.com/office/drawing/2014/main" id="{96704A88-0465-4310-8E42-A6E25EA36877}"/>
+              </a:ext>
+            </a:extLst>
+          </p:cNvPr>
+          <p:cNvCxnSpPr>
+            <a:cxnSpLocks/>
+            <a:stCxn id="41" idx="0"/>
+            <a:endCxn id="38" idx="2"/>
+          </p:cNvCxnSpPr>
+          <p:nvPr/>
+        </p:nvCxnSpPr>
+        <p:spPr>
+          <a:xfrm flipV="1">
+            <a:off x="1669097" y="5090064"/>
+            <a:ext cx="0" cy="490728"/>
+          </a:xfrm>
+          <a:prstGeom prst="straightConnector1">
+            <a:avLst/>
+          </a:prstGeom>
+          <a:ln>
+            <a:headEnd type="triangle"/>
+            <a:tailEnd type="triangle"/>
+          </a:ln>
+        </p:spPr>
+        <p:style>
+          <a:lnRef idx="1">
+            <a:schemeClr val="accent1"/>
+          </a:lnRef>
+          <a:fillRef idx="0">
+            <a:schemeClr val="accent1"/>
+          </a:fillRef>
+          <a:effectRef idx="0">
+            <a:schemeClr val="accent1"/>
+          </a:effectRef>
+          <a:fontRef idx="minor">
+            <a:schemeClr val="tx1"/>
+          </a:fontRef>
+        </p:style>
+      </p:cxnSp>
+      <p:cxnSp>
+        <p:nvCxnSpPr>
+          <p:cNvPr id="44" name="Gerade Verbindung mit Pfeil 43">
+            <a:extLst>
+              <a:ext uri="{FF2B5EF4-FFF2-40B4-BE49-F238E27FC236}">
+                <a16:creationId xmlns:a16="http://schemas.microsoft.com/office/drawing/2014/main" id="{46E5DBA5-3221-418D-8DDF-EC4667582C8F}"/>
+              </a:ext>
+            </a:extLst>
+          </p:cNvPr>
+          <p:cNvCxnSpPr>
+            <a:cxnSpLocks/>
+          </p:cNvCxnSpPr>
+          <p:nvPr/>
+        </p:nvCxnSpPr>
+        <p:spPr>
+          <a:xfrm flipV="1">
+            <a:off x="4935332" y="5090064"/>
+            <a:ext cx="0" cy="490728"/>
+          </a:xfrm>
+          <a:prstGeom prst="straightConnector1">
+            <a:avLst/>
+          </a:prstGeom>
+          <a:ln>
+            <a:headEnd type="triangle"/>
+            <a:tailEnd type="triangle"/>
+          </a:ln>
+        </p:spPr>
+        <p:style>
+          <a:lnRef idx="1">
+            <a:schemeClr val="accent1"/>
+          </a:lnRef>
+          <a:fillRef idx="0">
+            <a:schemeClr val="accent1"/>
+          </a:fillRef>
+          <a:effectRef idx="0">
+            <a:schemeClr val="accent1"/>
+          </a:effectRef>
+          <a:fontRef idx="minor">
+            <a:schemeClr val="tx1"/>
+          </a:fontRef>
+        </p:style>
+      </p:cxnSp>
+      <p:cxnSp>
+        <p:nvCxnSpPr>
+          <p:cNvPr id="45" name="Gerade Verbindung mit Pfeil 44">
+            <a:extLst>
+              <a:ext uri="{FF2B5EF4-FFF2-40B4-BE49-F238E27FC236}">
+                <a16:creationId xmlns:a16="http://schemas.microsoft.com/office/drawing/2014/main" id="{78E4056D-5781-445D-B4F1-800D7C1F7E95}"/>
+              </a:ext>
+            </a:extLst>
+          </p:cNvPr>
+          <p:cNvCxnSpPr/>
+          <p:nvPr/>
+        </p:nvCxnSpPr>
+        <p:spPr>
+          <a:xfrm flipV="1">
+            <a:off x="4917651" y="3922680"/>
+            <a:ext cx="0" cy="490728"/>
+          </a:xfrm>
+          <a:prstGeom prst="straightConnector1">
+            <a:avLst/>
+          </a:prstGeom>
+          <a:ln>
+            <a:headEnd type="triangle"/>
+            <a:tailEnd type="triangle"/>
+          </a:ln>
+        </p:spPr>
+        <p:style>
+          <a:lnRef idx="1">
+            <a:schemeClr val="accent1"/>
+          </a:lnRef>
+          <a:fillRef idx="0">
+            <a:schemeClr val="accent1"/>
+          </a:fillRef>
+          <a:effectRef idx="0">
+            <a:schemeClr val="accent1"/>
+          </a:effectRef>
+          <a:fontRef idx="minor">
+            <a:schemeClr val="tx1"/>
+          </a:fontRef>
+        </p:style>
+      </p:cxnSp>
+      <p:cxnSp>
+        <p:nvCxnSpPr>
+          <p:cNvPr id="46" name="Gerade Verbindung mit Pfeil 45">
+            <a:extLst>
+              <a:ext uri="{FF2B5EF4-FFF2-40B4-BE49-F238E27FC236}">
+                <a16:creationId xmlns:a16="http://schemas.microsoft.com/office/drawing/2014/main" id="{EFFCE3EE-45FB-46AD-84BC-7291672419B6}"/>
+              </a:ext>
+            </a:extLst>
+          </p:cNvPr>
+          <p:cNvCxnSpPr/>
+          <p:nvPr/>
+        </p:nvCxnSpPr>
+        <p:spPr>
+          <a:xfrm flipV="1">
+            <a:off x="3339394" y="3922680"/>
+            <a:ext cx="0" cy="490728"/>
+          </a:xfrm>
+          <a:prstGeom prst="straightConnector1">
+            <a:avLst/>
+          </a:prstGeom>
+          <a:ln>
+            <a:headEnd type="triangle"/>
+            <a:tailEnd type="triangle"/>
+          </a:ln>
+        </p:spPr>
+        <p:style>
+          <a:lnRef idx="1">
+            <a:schemeClr val="accent1"/>
+          </a:lnRef>
+          <a:fillRef idx="0">
+            <a:schemeClr val="accent1"/>
+          </a:fillRef>
+          <a:effectRef idx="0">
+            <a:schemeClr val="accent1"/>
+          </a:effectRef>
+          <a:fontRef idx="minor">
+            <a:schemeClr val="tx1"/>
+          </a:fontRef>
+        </p:style>
+      </p:cxnSp>
+      <p:cxnSp>
+        <p:nvCxnSpPr>
+          <p:cNvPr id="47" name="Gerade Verbindung mit Pfeil 46">
+            <a:extLst>
+              <a:ext uri="{FF2B5EF4-FFF2-40B4-BE49-F238E27FC236}">
+                <a16:creationId xmlns:a16="http://schemas.microsoft.com/office/drawing/2014/main" id="{27AC5892-0F32-42BC-BDFE-101CE3619FD5}"/>
+              </a:ext>
+            </a:extLst>
+          </p:cNvPr>
+          <p:cNvCxnSpPr/>
+          <p:nvPr/>
+        </p:nvCxnSpPr>
+        <p:spPr>
+          <a:xfrm flipV="1">
+            <a:off x="1652643" y="3922680"/>
+            <a:ext cx="0" cy="490728"/>
+          </a:xfrm>
+          <a:prstGeom prst="straightConnector1">
+            <a:avLst/>
+          </a:prstGeom>
+          <a:ln>
+            <a:headEnd type="triangle"/>
+            <a:tailEnd type="triangle"/>
+          </a:ln>
+        </p:spPr>
+        <p:style>
+          <a:lnRef idx="1">
+            <a:schemeClr val="accent1"/>
+          </a:lnRef>
+          <a:fillRef idx="0">
+            <a:schemeClr val="accent1"/>
+          </a:fillRef>
+          <a:effectRef idx="0">
+            <a:schemeClr val="accent1"/>
+          </a:effectRef>
+          <a:fontRef idx="minor">
+            <a:schemeClr val="tx1"/>
+          </a:fontRef>
+        </p:style>
+      </p:cxnSp>
+    </p:spTree>
+    <p:extLst>
+      <p:ext uri="{BB962C8B-B14F-4D97-AF65-F5344CB8AC3E}">
+        <p14:creationId xmlns:p14="http://schemas.microsoft.com/office/powerpoint/2010/main" val="3818500160"/>
+      </p:ext>
+    </p:extLst>
+  </p:cSld>
+  <p:clrMapOvr>
+    <a:masterClrMapping/>
+  </p:clrMapOvr>
+</p:sld>
+</file>
+
+<file path=ppt/slides/slide3.xml><?xml version="1.0" encoding="utf-8"?>
+<p:sld xmlns:a="http://schemas.openxmlformats.org/drawingml/2006/main" xmlns:r="http://schemas.openxmlformats.org/officeDocument/2006/relationships" xmlns:p="http://schemas.openxmlformats.org/presentationml/2006/main">
+  <p:cSld>
+    <p:spTree>
+      <p:nvGrpSpPr>
+        <p:cNvPr id="1" name=""/>
+        <p:cNvGrpSpPr/>
+        <p:nvPr/>
+      </p:nvGrpSpPr>
+      <p:grpSpPr>
+        <a:xfrm>
+          <a:off x="0" y="0"/>
+          <a:ext cx="0" cy="0"/>
+          <a:chOff x="0" y="0"/>
+          <a:chExt cx="0" cy="0"/>
+        </a:xfrm>
+      </p:grpSpPr>
+      <p:sp>
+        <p:nvSpPr>
+          <p:cNvPr id="2" name="Titel 1">
+            <a:extLst>
+              <a:ext uri="{FF2B5EF4-FFF2-40B4-BE49-F238E27FC236}">
+                <a16:creationId xmlns:a16="http://schemas.microsoft.com/office/drawing/2014/main" id="{A45D0508-2363-4D05-AB94-0CEB4D46EA02}"/>
+              </a:ext>
+            </a:extLst>
+          </p:cNvPr>
+          <p:cNvSpPr>
+            <a:spLocks noGrp="1"/>
+          </p:cNvSpPr>
+          <p:nvPr>
+            <p:ph type="title"/>
+          </p:nvPr>
+        </p:nvSpPr>
+        <p:spPr/>
+        <p:txBody>
+          <a:bodyPr/>
+          <a:lstStyle/>
+          <a:p>
+            <a:r>
+              <a:rPr lang="de-DE" dirty="0" err="1"/>
+              <a:t>MTPPy</a:t>
+            </a:r>
+            <a:endParaRPr lang="de-DE" dirty="0"/>
+          </a:p>
+        </p:txBody>
+      </p:sp>
+      <p:sp>
+        <p:nvSpPr>
+          <p:cNvPr id="38" name="Rechteck 37">
+            <a:extLst>
+              <a:ext uri="{FF2B5EF4-FFF2-40B4-BE49-F238E27FC236}">
+                <a16:creationId xmlns:a16="http://schemas.microsoft.com/office/drawing/2014/main" id="{E107698C-C2A4-4070-B71D-C3D1678ADBF7}"/>
+              </a:ext>
+            </a:extLst>
+          </p:cNvPr>
+          <p:cNvSpPr/>
+          <p:nvPr/>
+        </p:nvSpPr>
+        <p:spPr>
+          <a:xfrm>
+            <a:off x="6728163" y="3261360"/>
+            <a:ext cx="4625637" cy="676656"/>
+          </a:xfrm>
+          <a:prstGeom prst="rect">
+            <a:avLst/>
+          </a:prstGeom>
+        </p:spPr>
+        <p:style>
+          <a:lnRef idx="2">
+            <a:schemeClr val="accent1">
+              <a:shade val="50000"/>
+            </a:schemeClr>
+          </a:lnRef>
+          <a:fillRef idx="1">
+            <a:schemeClr val="accent1"/>
+          </a:fillRef>
+          <a:effectRef idx="0">
+            <a:schemeClr val="accent1"/>
+          </a:effectRef>
+          <a:fontRef idx="minor">
+            <a:schemeClr val="lt1"/>
+          </a:fontRef>
+        </p:style>
+        <p:txBody>
+          <a:bodyPr rtlCol="0" anchor="ctr"/>
+          <a:lstStyle/>
+          <a:p>
+            <a:pPr algn="ctr"/>
+            <a:r>
+              <a:rPr lang="de-DE" dirty="0" err="1"/>
+              <a:t>Process</a:t>
+            </a:r>
+            <a:r>
+              <a:rPr lang="de-DE" dirty="0"/>
+              <a:t> Orchestration Layer</a:t>
+            </a:r>
+          </a:p>
+        </p:txBody>
+      </p:sp>
+      <p:sp>
+        <p:nvSpPr>
+          <p:cNvPr id="39" name="Textfeld 38">
+            <a:extLst>
+              <a:ext uri="{FF2B5EF4-FFF2-40B4-BE49-F238E27FC236}">
+                <a16:creationId xmlns:a16="http://schemas.microsoft.com/office/drawing/2014/main" id="{31686837-6DBD-4BA1-AA02-C9A381FED7C0}"/>
+              </a:ext>
+            </a:extLst>
+          </p:cNvPr>
+          <p:cNvSpPr txBox="1"/>
+          <p:nvPr/>
+        </p:nvSpPr>
+        <p:spPr>
+          <a:xfrm>
+            <a:off x="6728163" y="1717168"/>
+            <a:ext cx="4625637" cy="1477328"/>
+          </a:xfrm>
+          <a:prstGeom prst="rect">
+            <a:avLst/>
+          </a:prstGeom>
+          <a:noFill/>
+        </p:spPr>
+        <p:txBody>
+          <a:bodyPr wrap="square" rtlCol="0">
+            <a:spAutoFit/>
+          </a:bodyPr>
+          <a:lstStyle/>
+          <a:p>
+            <a:r>
+              <a:rPr lang="de-DE" dirty="0"/>
+              <a:t>Scenario 3: hybrid </a:t>
+            </a:r>
+            <a:r>
+              <a:rPr lang="de-DE" dirty="0" err="1"/>
+              <a:t>module</a:t>
+            </a:r>
+            <a:endParaRPr lang="de-DE" dirty="0"/>
+          </a:p>
+          <a:p>
+            <a:pPr marL="285750" indent="-285750">
+              <a:buFont typeface="Arial" panose="020B0604020202020204" pitchFamily="34" charset="0"/>
+              <a:buChar char="•"/>
+            </a:pPr>
+            <a:r>
+              <a:rPr lang="de-DE" dirty="0" err="1"/>
+              <a:t>Indirect</a:t>
+            </a:r>
+            <a:r>
+              <a:rPr lang="de-DE" dirty="0"/>
+              <a:t> </a:t>
+            </a:r>
+            <a:r>
+              <a:rPr lang="de-DE" dirty="0" err="1"/>
+              <a:t>connections</a:t>
+            </a:r>
+            <a:r>
+              <a:rPr lang="de-DE" dirty="0"/>
+              <a:t> </a:t>
+            </a:r>
+            <a:r>
+              <a:rPr lang="de-DE" dirty="0" err="1"/>
+              <a:t>to</a:t>
+            </a:r>
+            <a:r>
+              <a:rPr lang="de-DE" dirty="0"/>
+              <a:t> </a:t>
+            </a:r>
+            <a:r>
+              <a:rPr lang="de-DE" dirty="0" err="1"/>
+              <a:t>field</a:t>
+            </a:r>
+            <a:r>
+              <a:rPr lang="de-DE" dirty="0"/>
+              <a:t> </a:t>
+            </a:r>
+            <a:r>
+              <a:rPr lang="de-DE" dirty="0" err="1"/>
+              <a:t>devices</a:t>
+            </a:r>
+            <a:r>
+              <a:rPr lang="de-DE" dirty="0"/>
+              <a:t> via PLC (</a:t>
+            </a:r>
+            <a:r>
+              <a:rPr lang="de-DE" dirty="0" err="1"/>
+              <a:t>ModbusTCP</a:t>
+            </a:r>
+            <a:r>
+              <a:rPr lang="de-DE" dirty="0"/>
+              <a:t> etc.)</a:t>
+            </a:r>
+          </a:p>
+          <a:p>
+            <a:pPr marL="285750" indent="-285750">
+              <a:buFont typeface="Arial" panose="020B0604020202020204" pitchFamily="34" charset="0"/>
+              <a:buChar char="•"/>
+            </a:pPr>
+            <a:r>
+              <a:rPr lang="de-DE" dirty="0" err="1"/>
+              <a:t>For</a:t>
+            </a:r>
+            <a:r>
+              <a:rPr lang="de-DE" dirty="0"/>
+              <a:t> </a:t>
+            </a:r>
+            <a:r>
+              <a:rPr lang="de-DE" dirty="0" err="1"/>
+              <a:t>modules</a:t>
+            </a:r>
+            <a:r>
+              <a:rPr lang="de-DE" dirty="0"/>
+              <a:t> </a:t>
+            </a:r>
+            <a:r>
+              <a:rPr lang="de-DE" dirty="0" err="1"/>
+              <a:t>with</a:t>
+            </a:r>
+            <a:r>
+              <a:rPr lang="de-DE" dirty="0"/>
+              <a:t> </a:t>
+            </a:r>
+            <a:r>
+              <a:rPr lang="de-DE" dirty="0" err="1"/>
+              <a:t>physical</a:t>
+            </a:r>
+            <a:r>
+              <a:rPr lang="de-DE" dirty="0"/>
+              <a:t> </a:t>
+            </a:r>
+            <a:r>
+              <a:rPr lang="de-DE" dirty="0" err="1"/>
+              <a:t>actuators</a:t>
+            </a:r>
+            <a:r>
+              <a:rPr lang="de-DE" dirty="0"/>
+              <a:t> and </a:t>
+            </a:r>
+            <a:r>
+              <a:rPr lang="de-DE" dirty="0" err="1"/>
+              <a:t>sensors</a:t>
+            </a:r>
+            <a:r>
+              <a:rPr lang="de-DE" dirty="0"/>
+              <a:t> and </a:t>
+            </a:r>
+            <a:r>
+              <a:rPr lang="de-DE" dirty="0" err="1"/>
+              <a:t>safety-critical</a:t>
+            </a:r>
+            <a:r>
+              <a:rPr lang="de-DE" dirty="0"/>
+              <a:t> </a:t>
+            </a:r>
+            <a:r>
+              <a:rPr lang="de-DE" dirty="0" err="1"/>
+              <a:t>interlocks</a:t>
+            </a:r>
+            <a:endParaRPr lang="de-DE" dirty="0"/>
+          </a:p>
+        </p:txBody>
+      </p:sp>
+      <p:sp>
+        <p:nvSpPr>
+          <p:cNvPr id="40" name="Rechteck 39">
+            <a:extLst>
+              <a:ext uri="{FF2B5EF4-FFF2-40B4-BE49-F238E27FC236}">
+                <a16:creationId xmlns:a16="http://schemas.microsoft.com/office/drawing/2014/main" id="{E9D6AF5A-F453-48E6-972F-CB0436A9B882}"/>
+              </a:ext>
+            </a:extLst>
+          </p:cNvPr>
+          <p:cNvSpPr/>
+          <p:nvPr/>
+        </p:nvSpPr>
+        <p:spPr>
+          <a:xfrm>
+            <a:off x="6728164" y="4428744"/>
+            <a:ext cx="1363064" cy="676656"/>
+          </a:xfrm>
+          <a:prstGeom prst="rect">
+            <a:avLst/>
+          </a:prstGeom>
+        </p:spPr>
+        <p:style>
+          <a:lnRef idx="2">
+            <a:schemeClr val="accent1">
+              <a:shade val="50000"/>
+            </a:schemeClr>
+          </a:lnRef>
+          <a:fillRef idx="1">
+            <a:schemeClr val="accent1"/>
+          </a:fillRef>
+          <a:effectRef idx="0">
+            <a:schemeClr val="accent1"/>
+          </a:effectRef>
+          <a:fontRef idx="minor">
+            <a:schemeClr val="lt1"/>
+          </a:fontRef>
+        </p:style>
+        <p:txBody>
+          <a:bodyPr rtlCol="0" anchor="ctr"/>
+          <a:lstStyle/>
+          <a:p>
+            <a:pPr algn="ctr"/>
+            <a:r>
+              <a:rPr lang="de-DE" dirty="0"/>
+              <a:t>PEA 1</a:t>
+            </a:r>
+          </a:p>
+        </p:txBody>
+      </p:sp>
+      <p:sp>
+        <p:nvSpPr>
+          <p:cNvPr id="41" name="Rechteck 40">
+            <a:extLst>
+              <a:ext uri="{FF2B5EF4-FFF2-40B4-BE49-F238E27FC236}">
+                <a16:creationId xmlns:a16="http://schemas.microsoft.com/office/drawing/2014/main" id="{A15E2EC5-4E99-40A7-BDF3-105CF1B8EA15}"/>
+              </a:ext>
+            </a:extLst>
+          </p:cNvPr>
+          <p:cNvSpPr/>
+          <p:nvPr/>
+        </p:nvSpPr>
+        <p:spPr>
+          <a:xfrm>
+            <a:off x="8381998" y="4191000"/>
+            <a:ext cx="1363064" cy="676656"/>
+          </a:xfrm>
+          <a:prstGeom prst="rect">
+            <a:avLst/>
+          </a:prstGeom>
+        </p:spPr>
+        <p:style>
+          <a:lnRef idx="2">
+            <a:schemeClr val="accent1">
+              <a:shade val="50000"/>
+            </a:schemeClr>
+          </a:lnRef>
+          <a:fillRef idx="1">
+            <a:schemeClr val="accent1"/>
+          </a:fillRef>
+          <a:effectRef idx="0">
+            <a:schemeClr val="accent1"/>
+          </a:effectRef>
+          <a:fontRef idx="minor">
+            <a:schemeClr val="lt1"/>
+          </a:fontRef>
+        </p:style>
+        <p:txBody>
+          <a:bodyPr rtlCol="0" anchor="ctr"/>
+          <a:lstStyle/>
+          <a:p>
+            <a:pPr algn="ctr"/>
+            <a:r>
+              <a:rPr lang="de-DE" dirty="0"/>
+              <a:t>PEA 2</a:t>
+            </a:r>
+          </a:p>
+          <a:p>
+            <a:pPr algn="ctr"/>
+            <a:r>
+              <a:rPr lang="de-DE" sz="1400" dirty="0" err="1"/>
+              <a:t>MTTPy</a:t>
+            </a:r>
+            <a:r>
+              <a:rPr lang="de-DE" sz="1400" dirty="0"/>
+              <a:t> on </a:t>
+            </a:r>
+            <a:r>
+              <a:rPr lang="de-DE" sz="1400" dirty="0" err="1"/>
+              <a:t>edge</a:t>
+            </a:r>
+            <a:endParaRPr lang="de-DE" sz="1400" dirty="0"/>
+          </a:p>
+        </p:txBody>
+      </p:sp>
+      <p:sp>
+        <p:nvSpPr>
+          <p:cNvPr id="42" name="Rechteck 41">
+            <a:extLst>
+              <a:ext uri="{FF2B5EF4-FFF2-40B4-BE49-F238E27FC236}">
+                <a16:creationId xmlns:a16="http://schemas.microsoft.com/office/drawing/2014/main" id="{03B040D3-2B67-423C-AE70-7A8CE50BB7E7}"/>
+              </a:ext>
+            </a:extLst>
+          </p:cNvPr>
+          <p:cNvSpPr/>
+          <p:nvPr/>
+        </p:nvSpPr>
+        <p:spPr>
+          <a:xfrm>
+            <a:off x="9990736" y="4428744"/>
+            <a:ext cx="1363064" cy="676656"/>
+          </a:xfrm>
+          <a:prstGeom prst="rect">
+            <a:avLst/>
+          </a:prstGeom>
+        </p:spPr>
+        <p:style>
+          <a:lnRef idx="2">
+            <a:schemeClr val="accent1">
+              <a:shade val="50000"/>
+            </a:schemeClr>
+          </a:lnRef>
+          <a:fillRef idx="1">
+            <a:schemeClr val="accent1"/>
+          </a:fillRef>
+          <a:effectRef idx="0">
+            <a:schemeClr val="accent1"/>
+          </a:effectRef>
+          <a:fontRef idx="minor">
+            <a:schemeClr val="lt1"/>
+          </a:fontRef>
+        </p:style>
+        <p:txBody>
+          <a:bodyPr rtlCol="0" anchor="ctr"/>
+          <a:lstStyle/>
+          <a:p>
+            <a:pPr algn="ctr"/>
+            <a:r>
+              <a:rPr lang="de-DE" dirty="0"/>
+              <a:t>PEA 3</a:t>
+            </a:r>
+          </a:p>
+        </p:txBody>
+      </p:sp>
+      <p:sp>
+        <p:nvSpPr>
+          <p:cNvPr id="43" name="Rechteck 42">
+            <a:extLst>
+              <a:ext uri="{FF2B5EF4-FFF2-40B4-BE49-F238E27FC236}">
+                <a16:creationId xmlns:a16="http://schemas.microsoft.com/office/drawing/2014/main" id="{D9BA3233-A37B-4DA2-BAA7-131FB339BF49}"/>
+              </a:ext>
+            </a:extLst>
+          </p:cNvPr>
+          <p:cNvSpPr/>
+          <p:nvPr/>
+        </p:nvSpPr>
+        <p:spPr>
+          <a:xfrm>
+            <a:off x="6728164" y="5596128"/>
+            <a:ext cx="1363064" cy="676656"/>
+          </a:xfrm>
+          <a:prstGeom prst="rect">
+            <a:avLst/>
+          </a:prstGeom>
+        </p:spPr>
+        <p:style>
+          <a:lnRef idx="2">
+            <a:schemeClr val="accent1">
+              <a:shade val="50000"/>
+            </a:schemeClr>
+          </a:lnRef>
+          <a:fillRef idx="1">
+            <a:schemeClr val="accent1"/>
+          </a:fillRef>
+          <a:effectRef idx="0">
+            <a:schemeClr val="accent1"/>
+          </a:effectRef>
+          <a:fontRef idx="minor">
+            <a:schemeClr val="lt1"/>
+          </a:fontRef>
+        </p:style>
+        <p:txBody>
+          <a:bodyPr rtlCol="0" anchor="ctr"/>
+          <a:lstStyle/>
+          <a:p>
+            <a:pPr algn="ctr"/>
+            <a:r>
+              <a:rPr lang="de-DE" dirty="0"/>
+              <a:t>Field </a:t>
+            </a:r>
+            <a:r>
+              <a:rPr lang="de-DE" dirty="0" err="1"/>
+              <a:t>devices</a:t>
+            </a:r>
+            <a:endParaRPr lang="de-DE" dirty="0"/>
+          </a:p>
+        </p:txBody>
+      </p:sp>
+      <p:sp>
+        <p:nvSpPr>
+          <p:cNvPr id="44" name="Rechteck 43">
+            <a:extLst>
+              <a:ext uri="{FF2B5EF4-FFF2-40B4-BE49-F238E27FC236}">
+                <a16:creationId xmlns:a16="http://schemas.microsoft.com/office/drawing/2014/main" id="{33C8FAA6-16EB-4BE8-A84C-CDF71E18CDBB}"/>
+              </a:ext>
+            </a:extLst>
+          </p:cNvPr>
+          <p:cNvSpPr/>
+          <p:nvPr/>
+        </p:nvSpPr>
+        <p:spPr>
+          <a:xfrm>
+            <a:off x="9990736" y="5596128"/>
+            <a:ext cx="1363064" cy="676656"/>
+          </a:xfrm>
+          <a:prstGeom prst="rect">
+            <a:avLst/>
+          </a:prstGeom>
+        </p:spPr>
+        <p:style>
+          <a:lnRef idx="2">
+            <a:schemeClr val="accent1">
+              <a:shade val="50000"/>
+            </a:schemeClr>
+          </a:lnRef>
+          <a:fillRef idx="1">
+            <a:schemeClr val="accent1"/>
+          </a:fillRef>
+          <a:effectRef idx="0">
+            <a:schemeClr val="accent1"/>
+          </a:effectRef>
+          <a:fontRef idx="minor">
+            <a:schemeClr val="lt1"/>
+          </a:fontRef>
+        </p:style>
+        <p:txBody>
+          <a:bodyPr rtlCol="0" anchor="ctr"/>
+          <a:lstStyle/>
+          <a:p>
+            <a:pPr algn="ctr"/>
+            <a:r>
+              <a:rPr lang="de-DE" dirty="0"/>
+              <a:t>Field </a:t>
+            </a:r>
+            <a:r>
+              <a:rPr lang="de-DE" dirty="0" err="1"/>
+              <a:t>devices</a:t>
+            </a:r>
+            <a:endParaRPr lang="de-DE" dirty="0"/>
+          </a:p>
+        </p:txBody>
+      </p:sp>
+      <p:cxnSp>
+        <p:nvCxnSpPr>
+          <p:cNvPr id="45" name="Gerade Verbindung mit Pfeil 44">
+            <a:extLst>
+              <a:ext uri="{FF2B5EF4-FFF2-40B4-BE49-F238E27FC236}">
+                <a16:creationId xmlns:a16="http://schemas.microsoft.com/office/drawing/2014/main" id="{E3EB4DAF-58BD-48F5-B1E3-EF2A6F1AD03A}"/>
+              </a:ext>
+            </a:extLst>
+          </p:cNvPr>
+          <p:cNvCxnSpPr>
+            <a:cxnSpLocks/>
+            <a:stCxn id="43" idx="0"/>
+            <a:endCxn id="40" idx="2"/>
+          </p:cNvCxnSpPr>
+          <p:nvPr/>
+        </p:nvCxnSpPr>
+        <p:spPr>
+          <a:xfrm flipV="1">
+            <a:off x="7409696" y="5105400"/>
+            <a:ext cx="0" cy="490728"/>
+          </a:xfrm>
+          <a:prstGeom prst="straightConnector1">
+            <a:avLst/>
+          </a:prstGeom>
+          <a:ln>
+            <a:headEnd type="triangle"/>
+            <a:tailEnd type="triangle"/>
+          </a:ln>
+        </p:spPr>
+        <p:style>
+          <a:lnRef idx="1">
+            <a:schemeClr val="accent1"/>
+          </a:lnRef>
+          <a:fillRef idx="0">
+            <a:schemeClr val="accent1"/>
+          </a:fillRef>
+          <a:effectRef idx="0">
+            <a:schemeClr val="accent1"/>
+          </a:effectRef>
+          <a:fontRef idx="minor">
+            <a:schemeClr val="tx1"/>
+          </a:fontRef>
+        </p:style>
+      </p:cxnSp>
+      <p:cxnSp>
+        <p:nvCxnSpPr>
+          <p:cNvPr id="46" name="Gerade Verbindung mit Pfeil 45">
+            <a:extLst>
+              <a:ext uri="{FF2B5EF4-FFF2-40B4-BE49-F238E27FC236}">
+                <a16:creationId xmlns:a16="http://schemas.microsoft.com/office/drawing/2014/main" id="{923A9796-8B8E-428C-84A1-D4AEB30BE354}"/>
+              </a:ext>
+            </a:extLst>
+          </p:cNvPr>
+          <p:cNvCxnSpPr>
+            <a:cxnSpLocks/>
+          </p:cNvCxnSpPr>
+          <p:nvPr/>
+        </p:nvCxnSpPr>
+        <p:spPr>
+          <a:xfrm flipV="1">
+            <a:off x="10675931" y="5105400"/>
+            <a:ext cx="0" cy="490728"/>
+          </a:xfrm>
+          <a:prstGeom prst="straightConnector1">
+            <a:avLst/>
+          </a:prstGeom>
+          <a:ln>
+            <a:headEnd type="triangle"/>
+            <a:tailEnd type="triangle"/>
+          </a:ln>
+        </p:spPr>
+        <p:style>
+          <a:lnRef idx="1">
+            <a:schemeClr val="accent1"/>
+          </a:lnRef>
+          <a:fillRef idx="0">
+            <a:schemeClr val="accent1"/>
+          </a:fillRef>
+          <a:effectRef idx="0">
+            <a:schemeClr val="accent1"/>
+          </a:effectRef>
+          <a:fontRef idx="minor">
+            <a:schemeClr val="tx1"/>
+          </a:fontRef>
+        </p:style>
+      </p:cxnSp>
+      <p:cxnSp>
+        <p:nvCxnSpPr>
+          <p:cNvPr id="47" name="Gerade Verbindung mit Pfeil 46">
+            <a:extLst>
+              <a:ext uri="{FF2B5EF4-FFF2-40B4-BE49-F238E27FC236}">
+                <a16:creationId xmlns:a16="http://schemas.microsoft.com/office/drawing/2014/main" id="{E6D3519E-09B3-4003-817E-D000A4DCE87B}"/>
+              </a:ext>
+            </a:extLst>
+          </p:cNvPr>
+          <p:cNvCxnSpPr/>
+          <p:nvPr/>
+        </p:nvCxnSpPr>
+        <p:spPr>
+          <a:xfrm flipV="1">
+            <a:off x="10658250" y="3938016"/>
+            <a:ext cx="0" cy="490728"/>
+          </a:xfrm>
+          <a:prstGeom prst="straightConnector1">
+            <a:avLst/>
+          </a:prstGeom>
+          <a:ln>
+            <a:headEnd type="triangle"/>
+            <a:tailEnd type="triangle"/>
+          </a:ln>
+        </p:spPr>
+        <p:style>
+          <a:lnRef idx="1">
+            <a:schemeClr val="accent1"/>
+          </a:lnRef>
+          <a:fillRef idx="0">
+            <a:schemeClr val="accent1"/>
+          </a:fillRef>
+          <a:effectRef idx="0">
+            <a:schemeClr val="accent1"/>
+          </a:effectRef>
+          <a:fontRef idx="minor">
+            <a:schemeClr val="tx1"/>
+          </a:fontRef>
+        </p:style>
+      </p:cxnSp>
+      <p:cxnSp>
+        <p:nvCxnSpPr>
+          <p:cNvPr id="48" name="Gerade Verbindung mit Pfeil 47">
+            <a:extLst>
+              <a:ext uri="{FF2B5EF4-FFF2-40B4-BE49-F238E27FC236}">
+                <a16:creationId xmlns:a16="http://schemas.microsoft.com/office/drawing/2014/main" id="{C531877C-A806-4A9F-BA29-0D439AC8BE45}"/>
+              </a:ext>
+            </a:extLst>
+          </p:cNvPr>
+          <p:cNvCxnSpPr>
+            <a:cxnSpLocks/>
+          </p:cNvCxnSpPr>
+          <p:nvPr/>
+        </p:nvCxnSpPr>
+        <p:spPr>
+          <a:xfrm flipV="1">
+            <a:off x="9079993" y="3938016"/>
+            <a:ext cx="0" cy="240792"/>
+          </a:xfrm>
+          <a:prstGeom prst="straightConnector1">
+            <a:avLst/>
+          </a:prstGeom>
+          <a:ln>
+            <a:headEnd type="triangle"/>
+            <a:tailEnd type="triangle"/>
+          </a:ln>
+        </p:spPr>
+        <p:style>
+          <a:lnRef idx="1">
+            <a:schemeClr val="accent1"/>
+          </a:lnRef>
+          <a:fillRef idx="0">
+            <a:schemeClr val="accent1"/>
+          </a:fillRef>
+          <a:effectRef idx="0">
+            <a:schemeClr val="accent1"/>
+          </a:effectRef>
+          <a:fontRef idx="minor">
+            <a:schemeClr val="tx1"/>
+          </a:fontRef>
+        </p:style>
+      </p:cxnSp>
+      <p:cxnSp>
+        <p:nvCxnSpPr>
+          <p:cNvPr id="49" name="Gerade Verbindung mit Pfeil 48">
+            <a:extLst>
+              <a:ext uri="{FF2B5EF4-FFF2-40B4-BE49-F238E27FC236}">
+                <a16:creationId xmlns:a16="http://schemas.microsoft.com/office/drawing/2014/main" id="{D1AEDF22-C870-42CE-9CC2-BB6D914C4FBD}"/>
+              </a:ext>
+            </a:extLst>
+          </p:cNvPr>
+          <p:cNvCxnSpPr/>
+          <p:nvPr/>
+        </p:nvCxnSpPr>
+        <p:spPr>
+          <a:xfrm flipV="1">
+            <a:off x="7400553" y="3933444"/>
+            <a:ext cx="0" cy="490728"/>
+          </a:xfrm>
+          <a:prstGeom prst="straightConnector1">
+            <a:avLst/>
+          </a:prstGeom>
+          <a:ln>
+            <a:headEnd type="triangle"/>
+            <a:tailEnd type="triangle"/>
+          </a:ln>
+        </p:spPr>
+        <p:style>
+          <a:lnRef idx="1">
+            <a:schemeClr val="accent1"/>
+          </a:lnRef>
+          <a:fillRef idx="0">
+            <a:schemeClr val="accent1"/>
+          </a:fillRef>
+          <a:effectRef idx="0">
+            <a:schemeClr val="accent1"/>
+          </a:effectRef>
+          <a:fontRef idx="minor">
+            <a:schemeClr val="tx1"/>
+          </a:fontRef>
+        </p:style>
+      </p:cxnSp>
+      <p:cxnSp>
+        <p:nvCxnSpPr>
+          <p:cNvPr id="50" name="Gerade Verbindung mit Pfeil 49">
+            <a:extLst>
+              <a:ext uri="{FF2B5EF4-FFF2-40B4-BE49-F238E27FC236}">
+                <a16:creationId xmlns:a16="http://schemas.microsoft.com/office/drawing/2014/main" id="{2E42F733-CAD0-4B2A-850B-4DFD0B08878A}"/>
+              </a:ext>
+            </a:extLst>
+          </p:cNvPr>
+          <p:cNvCxnSpPr>
+            <a:cxnSpLocks/>
+            <a:stCxn id="51" idx="0"/>
+            <a:endCxn id="80" idx="2"/>
+          </p:cNvCxnSpPr>
+          <p:nvPr/>
+        </p:nvCxnSpPr>
+        <p:spPr>
+          <a:xfrm flipV="1">
+            <a:off x="9063530" y="5358384"/>
+            <a:ext cx="0" cy="237744"/>
+          </a:xfrm>
+          <a:prstGeom prst="straightConnector1">
+            <a:avLst/>
+          </a:prstGeom>
+          <a:ln>
+            <a:headEnd type="triangle"/>
+            <a:tailEnd type="triangle"/>
+          </a:ln>
+        </p:spPr>
+        <p:style>
+          <a:lnRef idx="1">
+            <a:schemeClr val="accent1"/>
+          </a:lnRef>
+          <a:fillRef idx="0">
+            <a:schemeClr val="accent1"/>
+          </a:fillRef>
+          <a:effectRef idx="0">
+            <a:schemeClr val="accent1"/>
+          </a:effectRef>
+          <a:fontRef idx="minor">
+            <a:schemeClr val="tx1"/>
+          </a:fontRef>
+        </p:style>
+      </p:cxnSp>
+      <p:sp>
+        <p:nvSpPr>
+          <p:cNvPr id="51" name="Rechteck 50">
+            <a:extLst>
+              <a:ext uri="{FF2B5EF4-FFF2-40B4-BE49-F238E27FC236}">
+                <a16:creationId xmlns:a16="http://schemas.microsoft.com/office/drawing/2014/main" id="{3B4CD10C-A004-40FC-A33A-980ADFF26B38}"/>
+              </a:ext>
+            </a:extLst>
+          </p:cNvPr>
+          <p:cNvSpPr/>
+          <p:nvPr/>
+        </p:nvSpPr>
+        <p:spPr>
+          <a:xfrm>
+            <a:off x="8381998" y="5596128"/>
+            <a:ext cx="1363064" cy="676656"/>
+          </a:xfrm>
+          <a:prstGeom prst="rect">
+            <a:avLst/>
+          </a:prstGeom>
+        </p:spPr>
+        <p:style>
+          <a:lnRef idx="2">
+            <a:schemeClr val="accent1">
+              <a:shade val="50000"/>
+            </a:schemeClr>
+          </a:lnRef>
+          <a:fillRef idx="1">
+            <a:schemeClr val="accent1"/>
+          </a:fillRef>
+          <a:effectRef idx="0">
+            <a:schemeClr val="accent1"/>
+          </a:effectRef>
+          <a:fontRef idx="minor">
+            <a:schemeClr val="lt1"/>
+          </a:fontRef>
+        </p:style>
+        <p:txBody>
+          <a:bodyPr rtlCol="0" anchor="ctr"/>
+          <a:lstStyle/>
+          <a:p>
+            <a:pPr algn="ctr"/>
+            <a:r>
+              <a:rPr lang="de-DE" dirty="0"/>
+              <a:t>Field </a:t>
+            </a:r>
+            <a:r>
+              <a:rPr lang="de-DE" dirty="0" err="1"/>
+              <a:t>devices</a:t>
+            </a:r>
+            <a:endParaRPr lang="de-DE" dirty="0"/>
+          </a:p>
+        </p:txBody>
+      </p:sp>
+      <p:sp>
+        <p:nvSpPr>
+          <p:cNvPr id="66" name="Rechteck 65">
+            <a:extLst>
+              <a:ext uri="{FF2B5EF4-FFF2-40B4-BE49-F238E27FC236}">
+                <a16:creationId xmlns:a16="http://schemas.microsoft.com/office/drawing/2014/main" id="{FC933E40-2CE1-4C42-815E-81A89046E913}"/>
+              </a:ext>
+            </a:extLst>
+          </p:cNvPr>
+          <p:cNvSpPr/>
+          <p:nvPr/>
+        </p:nvSpPr>
+        <p:spPr>
+          <a:xfrm>
+            <a:off x="983294" y="3261360"/>
+            <a:ext cx="4625637" cy="676656"/>
+          </a:xfrm>
+          <a:prstGeom prst="rect">
+            <a:avLst/>
+          </a:prstGeom>
+        </p:spPr>
+        <p:style>
+          <a:lnRef idx="2">
+            <a:schemeClr val="accent1">
+              <a:shade val="50000"/>
+            </a:schemeClr>
+          </a:lnRef>
+          <a:fillRef idx="1">
+            <a:schemeClr val="accent1"/>
+          </a:fillRef>
+          <a:effectRef idx="0">
+            <a:schemeClr val="accent1"/>
+          </a:effectRef>
+          <a:fontRef idx="minor">
+            <a:schemeClr val="lt1"/>
+          </a:fontRef>
+        </p:style>
+        <p:txBody>
+          <a:bodyPr rtlCol="0" anchor="ctr"/>
+          <a:lstStyle/>
+          <a:p>
+            <a:pPr algn="ctr"/>
+            <a:r>
+              <a:rPr lang="de-DE" dirty="0" err="1"/>
+              <a:t>Process</a:t>
+            </a:r>
+            <a:r>
+              <a:rPr lang="de-DE" dirty="0"/>
+              <a:t> Orchestration Layer</a:t>
+            </a:r>
+          </a:p>
+        </p:txBody>
+      </p:sp>
+      <p:sp>
+        <p:nvSpPr>
+          <p:cNvPr id="67" name="Textfeld 66">
+            <a:extLst>
+              <a:ext uri="{FF2B5EF4-FFF2-40B4-BE49-F238E27FC236}">
+                <a16:creationId xmlns:a16="http://schemas.microsoft.com/office/drawing/2014/main" id="{07218042-3AB6-4F3C-9895-D14868BBB2C6}"/>
+              </a:ext>
+            </a:extLst>
+          </p:cNvPr>
+          <p:cNvSpPr txBox="1"/>
+          <p:nvPr/>
+        </p:nvSpPr>
+        <p:spPr>
+          <a:xfrm>
+            <a:off x="983294" y="1717168"/>
+            <a:ext cx="4625637" cy="1477328"/>
+          </a:xfrm>
+          <a:prstGeom prst="rect">
+            <a:avLst/>
+          </a:prstGeom>
+          <a:noFill/>
+        </p:spPr>
+        <p:txBody>
+          <a:bodyPr wrap="square" rtlCol="0">
+            <a:spAutoFit/>
+          </a:bodyPr>
+          <a:lstStyle/>
+          <a:p>
+            <a:r>
+              <a:rPr lang="de-DE" dirty="0"/>
+              <a:t>Scenario 2: </a:t>
+            </a:r>
+            <a:r>
+              <a:rPr lang="de-DE" dirty="0" err="1"/>
+              <a:t>standard</a:t>
+            </a:r>
+            <a:r>
+              <a:rPr lang="de-DE" dirty="0"/>
+              <a:t> </a:t>
+            </a:r>
+            <a:r>
+              <a:rPr lang="de-DE" dirty="0" err="1"/>
+              <a:t>module</a:t>
+            </a:r>
+            <a:endParaRPr lang="de-DE" dirty="0"/>
+          </a:p>
+          <a:p>
+            <a:pPr marL="285750" indent="-285750">
+              <a:buFont typeface="Arial" panose="020B0604020202020204" pitchFamily="34" charset="0"/>
+              <a:buChar char="•"/>
+            </a:pPr>
+            <a:r>
+              <a:rPr lang="de-DE" dirty="0" err="1"/>
+              <a:t>Direct</a:t>
+            </a:r>
+            <a:r>
+              <a:rPr lang="de-DE" dirty="0"/>
+              <a:t> </a:t>
+            </a:r>
+            <a:r>
+              <a:rPr lang="de-DE" dirty="0" err="1"/>
+              <a:t>connections</a:t>
+            </a:r>
+            <a:r>
+              <a:rPr lang="de-DE" dirty="0"/>
+              <a:t> </a:t>
+            </a:r>
+            <a:r>
+              <a:rPr lang="de-DE" dirty="0" err="1"/>
+              <a:t>to</a:t>
+            </a:r>
+            <a:r>
+              <a:rPr lang="de-DE" dirty="0"/>
+              <a:t> </a:t>
+            </a:r>
+            <a:r>
+              <a:rPr lang="de-DE" dirty="0" err="1"/>
+              <a:t>field</a:t>
+            </a:r>
+            <a:r>
+              <a:rPr lang="de-DE" dirty="0"/>
+              <a:t> </a:t>
+            </a:r>
+            <a:r>
+              <a:rPr lang="de-DE" dirty="0" err="1"/>
+              <a:t>devices</a:t>
+            </a:r>
+            <a:r>
+              <a:rPr lang="de-DE" dirty="0"/>
+              <a:t> via </a:t>
+            </a:r>
+            <a:r>
+              <a:rPr lang="de-DE" dirty="0" err="1"/>
+              <a:t>interfaces</a:t>
+            </a:r>
+            <a:r>
+              <a:rPr lang="de-DE" dirty="0"/>
+              <a:t> (RS-232, GPIO, CAN, etc.)</a:t>
+            </a:r>
+          </a:p>
+          <a:p>
+            <a:pPr marL="285750" indent="-285750">
+              <a:buFont typeface="Arial" panose="020B0604020202020204" pitchFamily="34" charset="0"/>
+              <a:buChar char="•"/>
+            </a:pPr>
+            <a:r>
+              <a:rPr lang="de-DE" dirty="0" err="1"/>
+              <a:t>For</a:t>
+            </a:r>
+            <a:r>
+              <a:rPr lang="de-DE" dirty="0"/>
+              <a:t> </a:t>
+            </a:r>
+            <a:r>
+              <a:rPr lang="de-DE" dirty="0" err="1"/>
+              <a:t>modules</a:t>
+            </a:r>
+            <a:r>
+              <a:rPr lang="de-DE" dirty="0"/>
+              <a:t> </a:t>
+            </a:r>
+            <a:r>
+              <a:rPr lang="de-DE" dirty="0" err="1"/>
+              <a:t>with</a:t>
+            </a:r>
+            <a:r>
+              <a:rPr lang="de-DE" dirty="0"/>
+              <a:t> </a:t>
+            </a:r>
+            <a:r>
+              <a:rPr lang="de-DE" dirty="0" err="1"/>
+              <a:t>physical</a:t>
+            </a:r>
+            <a:r>
+              <a:rPr lang="de-DE" dirty="0"/>
+              <a:t> </a:t>
+            </a:r>
+            <a:r>
+              <a:rPr lang="de-DE" dirty="0" err="1"/>
+              <a:t>actuators</a:t>
+            </a:r>
+            <a:r>
+              <a:rPr lang="de-DE" dirty="0"/>
+              <a:t> and </a:t>
+            </a:r>
+            <a:r>
+              <a:rPr lang="de-DE" dirty="0" err="1"/>
+              <a:t>sensors</a:t>
+            </a:r>
+            <a:endParaRPr lang="de-DE" dirty="0"/>
+          </a:p>
+        </p:txBody>
+      </p:sp>
+      <p:sp>
+        <p:nvSpPr>
+          <p:cNvPr id="68" name="Rechteck 67">
+            <a:extLst>
+              <a:ext uri="{FF2B5EF4-FFF2-40B4-BE49-F238E27FC236}">
+                <a16:creationId xmlns:a16="http://schemas.microsoft.com/office/drawing/2014/main" id="{155788D3-7E84-4D39-B10E-ED55941C2FAB}"/>
+              </a:ext>
+            </a:extLst>
+          </p:cNvPr>
+          <p:cNvSpPr/>
+          <p:nvPr/>
+        </p:nvSpPr>
+        <p:spPr>
+          <a:xfrm>
+            <a:off x="983295" y="4428744"/>
+            <a:ext cx="1363064" cy="676656"/>
+          </a:xfrm>
+          <a:prstGeom prst="rect">
+            <a:avLst/>
+          </a:prstGeom>
+        </p:spPr>
+        <p:style>
+          <a:lnRef idx="2">
+            <a:schemeClr val="accent1">
+              <a:shade val="50000"/>
+            </a:schemeClr>
+          </a:lnRef>
+          <a:fillRef idx="1">
+            <a:schemeClr val="accent1"/>
+          </a:fillRef>
+          <a:effectRef idx="0">
+            <a:schemeClr val="accent1"/>
+          </a:effectRef>
+          <a:fontRef idx="minor">
+            <a:schemeClr val="lt1"/>
+          </a:fontRef>
+        </p:style>
+        <p:txBody>
+          <a:bodyPr rtlCol="0" anchor="ctr"/>
+          <a:lstStyle/>
+          <a:p>
+            <a:pPr algn="ctr"/>
+            <a:r>
+              <a:rPr lang="de-DE" dirty="0"/>
+              <a:t>PEA 1</a:t>
+            </a:r>
+          </a:p>
+          <a:p>
+            <a:pPr algn="ctr"/>
+            <a:r>
+              <a:rPr lang="de-DE" dirty="0"/>
+              <a:t>on PLC</a:t>
+            </a:r>
+          </a:p>
+        </p:txBody>
+      </p:sp>
+      <p:sp>
+        <p:nvSpPr>
+          <p:cNvPr id="69" name="Rechteck 68">
+            <a:extLst>
+              <a:ext uri="{FF2B5EF4-FFF2-40B4-BE49-F238E27FC236}">
+                <a16:creationId xmlns:a16="http://schemas.microsoft.com/office/drawing/2014/main" id="{249F2F27-C4BB-4BB6-ABE0-DD569A085DBA}"/>
+              </a:ext>
+            </a:extLst>
+          </p:cNvPr>
+          <p:cNvSpPr/>
+          <p:nvPr/>
+        </p:nvSpPr>
+        <p:spPr>
+          <a:xfrm>
+            <a:off x="2629819" y="4428744"/>
+            <a:ext cx="1363064" cy="676656"/>
+          </a:xfrm>
+          <a:prstGeom prst="rect">
+            <a:avLst/>
+          </a:prstGeom>
+        </p:spPr>
+        <p:style>
+          <a:lnRef idx="2">
+            <a:schemeClr val="accent1">
+              <a:shade val="50000"/>
+            </a:schemeClr>
+          </a:lnRef>
+          <a:fillRef idx="1">
+            <a:schemeClr val="accent1"/>
+          </a:fillRef>
+          <a:effectRef idx="0">
+            <a:schemeClr val="accent1"/>
+          </a:effectRef>
+          <a:fontRef idx="minor">
+            <a:schemeClr val="lt1"/>
+          </a:fontRef>
+        </p:style>
+        <p:txBody>
+          <a:bodyPr rtlCol="0" anchor="ctr"/>
+          <a:lstStyle/>
+          <a:p>
+            <a:pPr algn="ctr"/>
+            <a:r>
+              <a:rPr lang="de-DE" dirty="0"/>
+              <a:t>PEA 2</a:t>
+            </a:r>
+          </a:p>
+          <a:p>
+            <a:pPr algn="ctr"/>
+            <a:r>
+              <a:rPr lang="de-DE" sz="1400" dirty="0" err="1"/>
+              <a:t>MTTPy</a:t>
+            </a:r>
+            <a:r>
+              <a:rPr lang="de-DE" sz="1400" dirty="0"/>
+              <a:t> on </a:t>
+            </a:r>
+            <a:r>
+              <a:rPr lang="de-DE" sz="1400" dirty="0" err="1"/>
+              <a:t>edge</a:t>
+            </a:r>
+            <a:endParaRPr lang="de-DE" sz="1400" dirty="0"/>
+          </a:p>
+        </p:txBody>
+      </p:sp>
+      <p:sp>
+        <p:nvSpPr>
+          <p:cNvPr id="70" name="Rechteck 69">
+            <a:extLst>
+              <a:ext uri="{FF2B5EF4-FFF2-40B4-BE49-F238E27FC236}">
+                <a16:creationId xmlns:a16="http://schemas.microsoft.com/office/drawing/2014/main" id="{BC6A44B1-B85E-47BE-A2C2-19077B6E4F38}"/>
+              </a:ext>
+            </a:extLst>
+          </p:cNvPr>
+          <p:cNvSpPr/>
+          <p:nvPr/>
+        </p:nvSpPr>
+        <p:spPr>
+          <a:xfrm>
+            <a:off x="4245867" y="4428744"/>
+            <a:ext cx="1363064" cy="676656"/>
+          </a:xfrm>
+          <a:prstGeom prst="rect">
+            <a:avLst/>
+          </a:prstGeom>
+        </p:spPr>
+        <p:style>
+          <a:lnRef idx="2">
+            <a:schemeClr val="accent1">
+              <a:shade val="50000"/>
+            </a:schemeClr>
+          </a:lnRef>
+          <a:fillRef idx="1">
+            <a:schemeClr val="accent1"/>
+          </a:fillRef>
+          <a:effectRef idx="0">
+            <a:schemeClr val="accent1"/>
+          </a:effectRef>
+          <a:fontRef idx="minor">
+            <a:schemeClr val="lt1"/>
+          </a:fontRef>
+        </p:style>
+        <p:txBody>
+          <a:bodyPr rtlCol="0" anchor="ctr"/>
+          <a:lstStyle/>
+          <a:p>
+            <a:pPr algn="ctr"/>
+            <a:r>
+              <a:rPr lang="de-DE" dirty="0"/>
+              <a:t>PEA 3</a:t>
+            </a:r>
+          </a:p>
+          <a:p>
+            <a:pPr algn="ctr"/>
+            <a:r>
+              <a:rPr lang="de-DE" dirty="0"/>
+              <a:t>on PLC</a:t>
+            </a:r>
+          </a:p>
+        </p:txBody>
+      </p:sp>
+      <p:sp>
+        <p:nvSpPr>
+          <p:cNvPr id="71" name="Rechteck 70">
+            <a:extLst>
+              <a:ext uri="{FF2B5EF4-FFF2-40B4-BE49-F238E27FC236}">
+                <a16:creationId xmlns:a16="http://schemas.microsoft.com/office/drawing/2014/main" id="{32BFFD31-6144-4109-841A-495059C07CDF}"/>
+              </a:ext>
+            </a:extLst>
+          </p:cNvPr>
+          <p:cNvSpPr/>
+          <p:nvPr/>
+        </p:nvSpPr>
+        <p:spPr>
+          <a:xfrm>
+            <a:off x="983295" y="5596128"/>
+            <a:ext cx="1363064" cy="676656"/>
+          </a:xfrm>
+          <a:prstGeom prst="rect">
+            <a:avLst/>
+          </a:prstGeom>
+        </p:spPr>
+        <p:style>
+          <a:lnRef idx="2">
+            <a:schemeClr val="accent1">
+              <a:shade val="50000"/>
+            </a:schemeClr>
+          </a:lnRef>
+          <a:fillRef idx="1">
+            <a:schemeClr val="accent1"/>
+          </a:fillRef>
+          <a:effectRef idx="0">
+            <a:schemeClr val="accent1"/>
+          </a:effectRef>
+          <a:fontRef idx="minor">
+            <a:schemeClr val="lt1"/>
+          </a:fontRef>
+        </p:style>
+        <p:txBody>
+          <a:bodyPr rtlCol="0" anchor="ctr"/>
+          <a:lstStyle/>
+          <a:p>
+            <a:pPr algn="ctr"/>
+            <a:r>
+              <a:rPr lang="de-DE" dirty="0"/>
+              <a:t>Field </a:t>
+            </a:r>
+            <a:r>
+              <a:rPr lang="de-DE" dirty="0" err="1"/>
+              <a:t>devices</a:t>
+            </a:r>
+            <a:endParaRPr lang="de-DE" dirty="0"/>
+          </a:p>
+        </p:txBody>
+      </p:sp>
+      <p:sp>
+        <p:nvSpPr>
+          <p:cNvPr id="72" name="Rechteck 71">
+            <a:extLst>
+              <a:ext uri="{FF2B5EF4-FFF2-40B4-BE49-F238E27FC236}">
+                <a16:creationId xmlns:a16="http://schemas.microsoft.com/office/drawing/2014/main" id="{85324EF0-DCD8-47C9-8AC8-AEAB5876E963}"/>
+              </a:ext>
+            </a:extLst>
+          </p:cNvPr>
+          <p:cNvSpPr/>
+          <p:nvPr/>
+        </p:nvSpPr>
+        <p:spPr>
+          <a:xfrm>
+            <a:off x="4245867" y="5596128"/>
+            <a:ext cx="1363064" cy="676656"/>
+          </a:xfrm>
+          <a:prstGeom prst="rect">
+            <a:avLst/>
+          </a:prstGeom>
+        </p:spPr>
+        <p:style>
+          <a:lnRef idx="2">
+            <a:schemeClr val="accent1">
+              <a:shade val="50000"/>
+            </a:schemeClr>
+          </a:lnRef>
+          <a:fillRef idx="1">
+            <a:schemeClr val="accent1"/>
+          </a:fillRef>
+          <a:effectRef idx="0">
+            <a:schemeClr val="accent1"/>
+          </a:effectRef>
+          <a:fontRef idx="minor">
+            <a:schemeClr val="lt1"/>
+          </a:fontRef>
+        </p:style>
+        <p:txBody>
+          <a:bodyPr rtlCol="0" anchor="ctr"/>
+          <a:lstStyle/>
+          <a:p>
+            <a:pPr algn="ctr"/>
+            <a:r>
+              <a:rPr lang="de-DE" dirty="0"/>
+              <a:t>Field </a:t>
+            </a:r>
+            <a:r>
+              <a:rPr lang="de-DE" dirty="0" err="1"/>
+              <a:t>devices</a:t>
+            </a:r>
+            <a:endParaRPr lang="de-DE" dirty="0"/>
+          </a:p>
+        </p:txBody>
+      </p:sp>
+      <p:cxnSp>
+        <p:nvCxnSpPr>
+          <p:cNvPr id="73" name="Gerade Verbindung mit Pfeil 72">
+            <a:extLst>
+              <a:ext uri="{FF2B5EF4-FFF2-40B4-BE49-F238E27FC236}">
+                <a16:creationId xmlns:a16="http://schemas.microsoft.com/office/drawing/2014/main" id="{C3D6C22F-C29C-4446-AC19-0ABCB2A61AFF}"/>
+              </a:ext>
+            </a:extLst>
+          </p:cNvPr>
+          <p:cNvCxnSpPr>
+            <a:cxnSpLocks/>
+            <a:stCxn id="71" idx="0"/>
+            <a:endCxn id="68" idx="2"/>
+          </p:cNvCxnSpPr>
+          <p:nvPr/>
+        </p:nvCxnSpPr>
+        <p:spPr>
+          <a:xfrm flipV="1">
+            <a:off x="1664827" y="5105400"/>
+            <a:ext cx="0" cy="490728"/>
+          </a:xfrm>
+          <a:prstGeom prst="straightConnector1">
+            <a:avLst/>
+          </a:prstGeom>
+          <a:ln>
+            <a:headEnd type="triangle"/>
+            <a:tailEnd type="triangle"/>
+          </a:ln>
+        </p:spPr>
+        <p:style>
+          <a:lnRef idx="1">
+            <a:schemeClr val="accent1"/>
+          </a:lnRef>
+          <a:fillRef idx="0">
+            <a:schemeClr val="accent1"/>
+          </a:fillRef>
+          <a:effectRef idx="0">
+            <a:schemeClr val="accent1"/>
+          </a:effectRef>
+          <a:fontRef idx="minor">
+            <a:schemeClr val="tx1"/>
+          </a:fontRef>
+        </p:style>
+      </p:cxnSp>
+      <p:cxnSp>
+        <p:nvCxnSpPr>
+          <p:cNvPr id="74" name="Gerade Verbindung mit Pfeil 73">
+            <a:extLst>
+              <a:ext uri="{FF2B5EF4-FFF2-40B4-BE49-F238E27FC236}">
+                <a16:creationId xmlns:a16="http://schemas.microsoft.com/office/drawing/2014/main" id="{3886846A-DFB3-4F0F-8CB3-D6037772B2B4}"/>
+              </a:ext>
+            </a:extLst>
+          </p:cNvPr>
+          <p:cNvCxnSpPr>
+            <a:cxnSpLocks/>
+          </p:cNvCxnSpPr>
+          <p:nvPr/>
+        </p:nvCxnSpPr>
+        <p:spPr>
+          <a:xfrm flipV="1">
+            <a:off x="4931062" y="5105400"/>
+            <a:ext cx="0" cy="490728"/>
+          </a:xfrm>
+          <a:prstGeom prst="straightConnector1">
+            <a:avLst/>
+          </a:prstGeom>
+          <a:ln>
+            <a:headEnd type="triangle"/>
+            <a:tailEnd type="triangle"/>
+          </a:ln>
+        </p:spPr>
+        <p:style>
+          <a:lnRef idx="1">
+            <a:schemeClr val="accent1"/>
+          </a:lnRef>
+          <a:fillRef idx="0">
+            <a:schemeClr val="accent1"/>
+          </a:fillRef>
+          <a:effectRef idx="0">
+            <a:schemeClr val="accent1"/>
+          </a:effectRef>
+          <a:fontRef idx="minor">
+            <a:schemeClr val="tx1"/>
+          </a:fontRef>
+        </p:style>
+      </p:cxnSp>
+      <p:cxnSp>
+        <p:nvCxnSpPr>
+          <p:cNvPr id="75" name="Gerade Verbindung mit Pfeil 74">
+            <a:extLst>
+              <a:ext uri="{FF2B5EF4-FFF2-40B4-BE49-F238E27FC236}">
+                <a16:creationId xmlns:a16="http://schemas.microsoft.com/office/drawing/2014/main" id="{403128BC-4A8E-4E52-8640-0D7A318D03BC}"/>
+              </a:ext>
+            </a:extLst>
+          </p:cNvPr>
+          <p:cNvCxnSpPr/>
+          <p:nvPr/>
+        </p:nvCxnSpPr>
+        <p:spPr>
+          <a:xfrm flipV="1">
+            <a:off x="4913381" y="3938016"/>
+            <a:ext cx="0" cy="490728"/>
+          </a:xfrm>
+          <a:prstGeom prst="straightConnector1">
+            <a:avLst/>
+          </a:prstGeom>
+          <a:ln>
+            <a:headEnd type="triangle"/>
+            <a:tailEnd type="triangle"/>
+          </a:ln>
+        </p:spPr>
+        <p:style>
+          <a:lnRef idx="1">
+            <a:schemeClr val="accent1"/>
+          </a:lnRef>
+          <a:fillRef idx="0">
+            <a:schemeClr val="accent1"/>
+          </a:fillRef>
+          <a:effectRef idx="0">
+            <a:schemeClr val="accent1"/>
+          </a:effectRef>
+          <a:fontRef idx="minor">
+            <a:schemeClr val="tx1"/>
+          </a:fontRef>
+        </p:style>
+      </p:cxnSp>
+      <p:cxnSp>
+        <p:nvCxnSpPr>
+          <p:cNvPr id="76" name="Gerade Verbindung mit Pfeil 75">
+            <a:extLst>
+              <a:ext uri="{FF2B5EF4-FFF2-40B4-BE49-F238E27FC236}">
+                <a16:creationId xmlns:a16="http://schemas.microsoft.com/office/drawing/2014/main" id="{7961D89A-E65B-4E22-A4A1-80FCEBB28E49}"/>
+              </a:ext>
+            </a:extLst>
+          </p:cNvPr>
+          <p:cNvCxnSpPr/>
+          <p:nvPr/>
+        </p:nvCxnSpPr>
+        <p:spPr>
+          <a:xfrm flipV="1">
+            <a:off x="3335124" y="3938016"/>
+            <a:ext cx="0" cy="490728"/>
+          </a:xfrm>
+          <a:prstGeom prst="straightConnector1">
+            <a:avLst/>
+          </a:prstGeom>
+          <a:ln>
+            <a:headEnd type="triangle"/>
+            <a:tailEnd type="triangle"/>
+          </a:ln>
+        </p:spPr>
+        <p:style>
+          <a:lnRef idx="1">
+            <a:schemeClr val="accent1"/>
+          </a:lnRef>
+          <a:fillRef idx="0">
+            <a:schemeClr val="accent1"/>
+          </a:fillRef>
+          <a:effectRef idx="0">
+            <a:schemeClr val="accent1"/>
+          </a:effectRef>
+          <a:fontRef idx="minor">
+            <a:schemeClr val="tx1"/>
+          </a:fontRef>
+        </p:style>
+      </p:cxnSp>
+      <p:cxnSp>
+        <p:nvCxnSpPr>
+          <p:cNvPr id="77" name="Gerade Verbindung mit Pfeil 76">
+            <a:extLst>
+              <a:ext uri="{FF2B5EF4-FFF2-40B4-BE49-F238E27FC236}">
+                <a16:creationId xmlns:a16="http://schemas.microsoft.com/office/drawing/2014/main" id="{D52805F4-819D-4BED-8784-D3380E70FBC8}"/>
+              </a:ext>
+            </a:extLst>
+          </p:cNvPr>
+          <p:cNvCxnSpPr/>
+          <p:nvPr/>
+        </p:nvCxnSpPr>
+        <p:spPr>
+          <a:xfrm flipV="1">
+            <a:off x="1664827" y="3933444"/>
+            <a:ext cx="0" cy="490728"/>
+          </a:xfrm>
+          <a:prstGeom prst="straightConnector1">
+            <a:avLst/>
+          </a:prstGeom>
+          <a:ln>
+            <a:headEnd type="triangle"/>
+            <a:tailEnd type="triangle"/>
+          </a:ln>
+        </p:spPr>
+        <p:style>
+          <a:lnRef idx="1">
+            <a:schemeClr val="accent1"/>
+          </a:lnRef>
+          <a:fillRef idx="0">
+            <a:schemeClr val="accent1"/>
+          </a:fillRef>
+          <a:effectRef idx="0">
+            <a:schemeClr val="accent1"/>
+          </a:effectRef>
+          <a:fontRef idx="minor">
+            <a:schemeClr val="tx1"/>
+          </a:fontRef>
+        </p:style>
+      </p:cxnSp>
+      <p:cxnSp>
+        <p:nvCxnSpPr>
+          <p:cNvPr id="78" name="Gerade Verbindung mit Pfeil 77">
+            <a:extLst>
+              <a:ext uri="{FF2B5EF4-FFF2-40B4-BE49-F238E27FC236}">
+                <a16:creationId xmlns:a16="http://schemas.microsoft.com/office/drawing/2014/main" id="{B7D17388-C6FE-478E-924C-F611CDB4E642}"/>
+              </a:ext>
+            </a:extLst>
+          </p:cNvPr>
+          <p:cNvCxnSpPr>
+            <a:cxnSpLocks/>
+          </p:cNvCxnSpPr>
+          <p:nvPr/>
+        </p:nvCxnSpPr>
+        <p:spPr>
+          <a:xfrm flipV="1">
+            <a:off x="3335124" y="5105400"/>
+            <a:ext cx="0" cy="490728"/>
+          </a:xfrm>
+          <a:prstGeom prst="straightConnector1">
+            <a:avLst/>
+          </a:prstGeom>
+          <a:ln>
+            <a:headEnd type="triangle"/>
+            <a:tailEnd type="triangle"/>
+          </a:ln>
+        </p:spPr>
+        <p:style>
+          <a:lnRef idx="1">
+            <a:schemeClr val="accent1"/>
+          </a:lnRef>
+          <a:fillRef idx="0">
+            <a:schemeClr val="accent1"/>
+          </a:fillRef>
+          <a:effectRef idx="0">
+            <a:schemeClr val="accent1"/>
+          </a:effectRef>
+          <a:fontRef idx="minor">
+            <a:schemeClr val="tx1"/>
+          </a:fontRef>
+        </p:style>
+      </p:cxnSp>
+      <p:sp>
+        <p:nvSpPr>
+          <p:cNvPr id="79" name="Rechteck 78">
+            <a:extLst>
+              <a:ext uri="{FF2B5EF4-FFF2-40B4-BE49-F238E27FC236}">
+                <a16:creationId xmlns:a16="http://schemas.microsoft.com/office/drawing/2014/main" id="{2BC591B6-21D7-4B71-B48D-2BDF788258F6}"/>
+              </a:ext>
+            </a:extLst>
+          </p:cNvPr>
+          <p:cNvSpPr/>
+          <p:nvPr/>
+        </p:nvSpPr>
+        <p:spPr>
+          <a:xfrm>
+            <a:off x="2637129" y="5596128"/>
+            <a:ext cx="1363064" cy="676656"/>
+          </a:xfrm>
+          <a:prstGeom prst="rect">
+            <a:avLst/>
+          </a:prstGeom>
+        </p:spPr>
+        <p:style>
+          <a:lnRef idx="2">
+            <a:schemeClr val="accent1">
+              <a:shade val="50000"/>
+            </a:schemeClr>
+          </a:lnRef>
+          <a:fillRef idx="1">
+            <a:schemeClr val="accent1"/>
+          </a:fillRef>
+          <a:effectRef idx="0">
+            <a:schemeClr val="accent1"/>
+          </a:effectRef>
+          <a:fontRef idx="minor">
+            <a:schemeClr val="lt1"/>
+          </a:fontRef>
+        </p:style>
+        <p:txBody>
+          <a:bodyPr rtlCol="0" anchor="ctr"/>
+          <a:lstStyle/>
+          <a:p>
+            <a:pPr algn="ctr"/>
+            <a:r>
+              <a:rPr lang="de-DE" dirty="0"/>
+              <a:t>Field </a:t>
+            </a:r>
+            <a:r>
+              <a:rPr lang="de-DE" dirty="0" err="1"/>
+              <a:t>devices</a:t>
+            </a:r>
+            <a:endParaRPr lang="de-DE" dirty="0"/>
+          </a:p>
+        </p:txBody>
+      </p:sp>
+      <p:sp>
+        <p:nvSpPr>
+          <p:cNvPr id="80" name="Rechteck 79">
+            <a:extLst>
+              <a:ext uri="{FF2B5EF4-FFF2-40B4-BE49-F238E27FC236}">
+                <a16:creationId xmlns:a16="http://schemas.microsoft.com/office/drawing/2014/main" id="{4C68A9A1-2A94-4BB9-8BF8-9D44C27593B0}"/>
+              </a:ext>
+            </a:extLst>
+          </p:cNvPr>
+          <p:cNvSpPr/>
+          <p:nvPr/>
+        </p:nvSpPr>
+        <p:spPr>
+          <a:xfrm>
+            <a:off x="8381998" y="5052060"/>
+            <a:ext cx="1363064" cy="306324"/>
+          </a:xfrm>
+          <a:prstGeom prst="rect">
+            <a:avLst/>
+          </a:prstGeom>
+        </p:spPr>
+        <p:style>
+          <a:lnRef idx="2">
+            <a:schemeClr val="accent1">
+              <a:shade val="50000"/>
+            </a:schemeClr>
+          </a:lnRef>
+          <a:fillRef idx="1">
+            <a:schemeClr val="accent1"/>
+          </a:fillRef>
+          <a:effectRef idx="0">
+            <a:schemeClr val="accent1"/>
+          </a:effectRef>
+          <a:fontRef idx="minor">
+            <a:schemeClr val="lt1"/>
+          </a:fontRef>
+        </p:style>
+        <p:txBody>
+          <a:bodyPr rtlCol="0" anchor="ctr"/>
+          <a:lstStyle/>
+          <a:p>
+            <a:pPr algn="ctr"/>
+            <a:r>
+              <a:rPr lang="de-DE" dirty="0"/>
+              <a:t>PLC</a:t>
+            </a:r>
+            <a:endParaRPr lang="de-DE" sz="1400" dirty="0"/>
+          </a:p>
+        </p:txBody>
+      </p:sp>
+      <p:cxnSp>
+        <p:nvCxnSpPr>
+          <p:cNvPr id="82" name="Gerade Verbindung mit Pfeil 81">
+            <a:extLst>
+              <a:ext uri="{FF2B5EF4-FFF2-40B4-BE49-F238E27FC236}">
+                <a16:creationId xmlns:a16="http://schemas.microsoft.com/office/drawing/2014/main" id="{D598F2AE-1BB8-4CA5-975E-BDED0D4A94D3}"/>
+              </a:ext>
+            </a:extLst>
+          </p:cNvPr>
+          <p:cNvCxnSpPr>
+            <a:cxnSpLocks/>
+            <a:stCxn id="41" idx="2"/>
+            <a:endCxn id="80" idx="0"/>
+          </p:cNvCxnSpPr>
+          <p:nvPr/>
+        </p:nvCxnSpPr>
+        <p:spPr>
+          <a:xfrm>
+            <a:off x="9063530" y="4867656"/>
+            <a:ext cx="0" cy="184404"/>
+          </a:xfrm>
+          <a:prstGeom prst="straightConnector1">
+            <a:avLst/>
+          </a:prstGeom>
+          <a:ln>
+            <a:headEnd type="triangle"/>
+            <a:tailEnd type="triangle"/>
+          </a:ln>
+        </p:spPr>
+        <p:style>
+          <a:lnRef idx="1">
+            <a:schemeClr val="accent1"/>
+          </a:lnRef>
+          <a:fillRef idx="0">
+            <a:schemeClr val="accent1"/>
+          </a:fillRef>
+          <a:effectRef idx="0">
+            <a:schemeClr val="accent1"/>
+          </a:effectRef>
+          <a:fontRef idx="minor">
+            <a:schemeClr val="tx1"/>
+          </a:fontRef>
+        </p:style>
+      </p:cxnSp>
+    </p:spTree>
+    <p:extLst>
+      <p:ext uri="{BB962C8B-B14F-4D97-AF65-F5344CB8AC3E}">
+        <p14:creationId xmlns:p14="http://schemas.microsoft.com/office/powerpoint/2010/main" val="1526434526"/>
+      </p:ext>
+    </p:extLst>
+  </p:cSld>
+  <p:clrMapOvr>
+    <a:masterClrMapping/>
+  </p:clrMapOvr>
+</p:sld>
+</file>
+
+<file path=ppt/slides/slide4.xml><?xml version="1.0" encoding="utf-8"?>
+<p:sld xmlns:a="http://schemas.openxmlformats.org/drawingml/2006/main" xmlns:r="http://schemas.openxmlformats.org/officeDocument/2006/relationships" xmlns:p="http://schemas.openxmlformats.org/presentationml/2006/main">
+  <p:cSld>
+    <p:spTree>
+      <p:nvGrpSpPr>
+        <p:cNvPr id="1" name=""/>
+        <p:cNvGrpSpPr/>
+        <p:nvPr/>
+      </p:nvGrpSpPr>
+      <p:grpSpPr>
+        <a:xfrm>
+          <a:off x="0" y="0"/>
+          <a:ext cx="0" cy="0"/>
+          <a:chOff x="0" y="0"/>
+          <a:chExt cx="0" cy="0"/>
+        </a:xfrm>
+      </p:grpSpPr>
       <p:pic>
         <p:nvPicPr>
           <p:cNvPr id="6" name="Grafik 5">
@@ -3928,10 +6633,10 @@
       </p:sp>
       <p:sp>
         <p:nvSpPr>
-          <p:cNvPr id="20" name="Rechteck 19">
-            <a:extLst>
-              <a:ext uri="{FF2B5EF4-FFF2-40B4-BE49-F238E27FC236}">
-                <a16:creationId xmlns:a16="http://schemas.microsoft.com/office/drawing/2014/main" id="{228D7857-C285-4661-B946-3C34717F7E9B}"/>
+          <p:cNvPr id="18" name="Rechteck 17">
+            <a:extLst>
+              <a:ext uri="{FF2B5EF4-FFF2-40B4-BE49-F238E27FC236}">
+                <a16:creationId xmlns:a16="http://schemas.microsoft.com/office/drawing/2014/main" id="{726F8171-8927-4C47-A29E-72316DD78D22}"/>
               </a:ext>
             </a:extLst>
           </p:cNvPr>
@@ -3940,16 +6645,16 @@
         </p:nvSpPr>
         <p:spPr>
           <a:xfrm>
-            <a:off x="9993269" y="3038368"/>
-            <a:ext cx="841966" cy="327919"/>
+            <a:off x="2144823" y="1700658"/>
+            <a:ext cx="733032" cy="354121"/>
           </a:xfrm>
           <a:prstGeom prst="rect">
             <a:avLst/>
           </a:prstGeom>
           <a:solidFill>
-            <a:srgbClr val="FFC000">
+            <a:schemeClr val="accent6">
               <a:alpha val="25000"/>
-            </a:srgbClr>
+            </a:schemeClr>
           </a:solidFill>
           <a:ln>
             <a:noFill/>
@@ -3976,16 +6681,16 @@
           <a:lstStyle/>
           <a:p>
             <a:pPr algn="ctr"/>
-            <a:endParaRPr lang="de-DE"/>
-          </a:p>
-        </p:txBody>
-      </p:sp>
-      <p:sp>
-        <p:nvSpPr>
-          <p:cNvPr id="21" name="Rechteck 20">
-            <a:extLst>
-              <a:ext uri="{FF2B5EF4-FFF2-40B4-BE49-F238E27FC236}">
-                <a16:creationId xmlns:a16="http://schemas.microsoft.com/office/drawing/2014/main" id="{25E11D8E-B895-48B4-9AF9-C814C2E24317}"/>
+            <a:endParaRPr lang="de-DE" dirty="0"/>
+          </a:p>
+        </p:txBody>
+      </p:sp>
+      <p:sp>
+        <p:nvSpPr>
+          <p:cNvPr id="22" name="Rechteck 21">
+            <a:extLst>
+              <a:ext uri="{FF2B5EF4-FFF2-40B4-BE49-F238E27FC236}">
+                <a16:creationId xmlns:a16="http://schemas.microsoft.com/office/drawing/2014/main" id="{6B25BCF5-840A-4B46-B468-89DF1454F2D9}"/>
               </a:ext>
             </a:extLst>
           </p:cNvPr>
@@ -3994,16 +6699,16 @@
         </p:nvSpPr>
         <p:spPr>
           <a:xfrm>
-            <a:off x="9993269" y="3720911"/>
-            <a:ext cx="841966" cy="327919"/>
+            <a:off x="9154167" y="1846597"/>
+            <a:ext cx="1002203" cy="559146"/>
           </a:xfrm>
           <a:prstGeom prst="rect">
             <a:avLst/>
           </a:prstGeom>
           <a:solidFill>
-            <a:srgbClr val="FFC000">
+            <a:schemeClr val="accent6">
               <a:alpha val="25000"/>
-            </a:srgbClr>
+            </a:schemeClr>
           </a:solidFill>
           <a:ln>
             <a:noFill/>
@@ -4030,16 +6735,16 @@
           <a:lstStyle/>
           <a:p>
             <a:pPr algn="ctr"/>
-            <a:endParaRPr lang="de-DE"/>
-          </a:p>
-        </p:txBody>
-      </p:sp>
-      <p:sp>
-        <p:nvSpPr>
-          <p:cNvPr id="18" name="Rechteck 17">
-            <a:extLst>
-              <a:ext uri="{FF2B5EF4-FFF2-40B4-BE49-F238E27FC236}">
-                <a16:creationId xmlns:a16="http://schemas.microsoft.com/office/drawing/2014/main" id="{726F8171-8927-4C47-A29E-72316DD78D22}"/>
+            <a:endParaRPr lang="de-DE" dirty="0"/>
+          </a:p>
+        </p:txBody>
+      </p:sp>
+      <p:sp>
+        <p:nvSpPr>
+          <p:cNvPr id="25" name="Rechteck 24">
+            <a:extLst>
+              <a:ext uri="{FF2B5EF4-FFF2-40B4-BE49-F238E27FC236}">
+                <a16:creationId xmlns:a16="http://schemas.microsoft.com/office/drawing/2014/main" id="{9535C8F6-4A97-4179-A1CC-46F6918C6367}"/>
               </a:ext>
             </a:extLst>
           </p:cNvPr>
@@ -4048,7 +6753,7 @@
         </p:nvSpPr>
         <p:spPr>
           <a:xfrm>
-            <a:off x="2144823" y="1700658"/>
+            <a:off x="1983843" y="3094772"/>
             <a:ext cx="733032" cy="354121"/>
           </a:xfrm>
           <a:prstGeom prst="rect">
@@ -4084,16 +6789,16 @@
           <a:lstStyle/>
           <a:p>
             <a:pPr algn="ctr"/>
-            <a:endParaRPr lang="de-DE" dirty="0"/>
-          </a:p>
-        </p:txBody>
-      </p:sp>
-      <p:sp>
-        <p:nvSpPr>
-          <p:cNvPr id="22" name="Rechteck 21">
-            <a:extLst>
-              <a:ext uri="{FF2B5EF4-FFF2-40B4-BE49-F238E27FC236}">
-                <a16:creationId xmlns:a16="http://schemas.microsoft.com/office/drawing/2014/main" id="{6B25BCF5-840A-4B46-B468-89DF1454F2D9}"/>
+            <a:endParaRPr lang="de-DE"/>
+          </a:p>
+        </p:txBody>
+      </p:sp>
+      <p:sp>
+        <p:nvSpPr>
+          <p:cNvPr id="26" name="Rechteck 25">
+            <a:extLst>
+              <a:ext uri="{FF2B5EF4-FFF2-40B4-BE49-F238E27FC236}">
+                <a16:creationId xmlns:a16="http://schemas.microsoft.com/office/drawing/2014/main" id="{E00EB115-200D-4F3F-A34A-40610FB695D9}"/>
               </a:ext>
             </a:extLst>
           </p:cNvPr>
@@ -4102,8 +6807,8 @@
         </p:nvSpPr>
         <p:spPr>
           <a:xfrm>
-            <a:off x="9154167" y="1846597"/>
-            <a:ext cx="1002203" cy="559146"/>
+            <a:off x="8190669" y="2440714"/>
+            <a:ext cx="963497" cy="454886"/>
           </a:xfrm>
           <a:prstGeom prst="rect">
             <a:avLst/>
@@ -4138,16 +6843,16 @@
           <a:lstStyle/>
           <a:p>
             <a:pPr algn="ctr"/>
-            <a:endParaRPr lang="de-DE" dirty="0"/>
-          </a:p>
-        </p:txBody>
-      </p:sp>
-      <p:sp>
-        <p:nvSpPr>
-          <p:cNvPr id="25" name="Rechteck 24">
-            <a:extLst>
-              <a:ext uri="{FF2B5EF4-FFF2-40B4-BE49-F238E27FC236}">
-                <a16:creationId xmlns:a16="http://schemas.microsoft.com/office/drawing/2014/main" id="{9535C8F6-4A97-4179-A1CC-46F6918C6367}"/>
+            <a:endParaRPr lang="de-DE"/>
+          </a:p>
+        </p:txBody>
+      </p:sp>
+      <p:sp>
+        <p:nvSpPr>
+          <p:cNvPr id="23" name="Rechteck 22">
+            <a:extLst>
+              <a:ext uri="{FF2B5EF4-FFF2-40B4-BE49-F238E27FC236}">
+                <a16:creationId xmlns:a16="http://schemas.microsoft.com/office/drawing/2014/main" id="{1B2B8A7A-2644-498F-8C69-73A4CD8EA957}"/>
               </a:ext>
             </a:extLst>
           </p:cNvPr>
@@ -4156,16 +6861,16 @@
         </p:nvSpPr>
         <p:spPr>
           <a:xfrm>
-            <a:off x="1983843" y="3094772"/>
-            <a:ext cx="733032" cy="354121"/>
+            <a:off x="664622" y="3513872"/>
+            <a:ext cx="841966" cy="1126141"/>
           </a:xfrm>
           <a:prstGeom prst="rect">
             <a:avLst/>
           </a:prstGeom>
           <a:solidFill>
-            <a:schemeClr val="accent6">
+            <a:srgbClr val="FFC000">
               <a:alpha val="25000"/>
-            </a:schemeClr>
+            </a:srgbClr>
           </a:solidFill>
           <a:ln>
             <a:noFill/>
@@ -4198,10 +6903,10 @@
       </p:sp>
       <p:sp>
         <p:nvSpPr>
-          <p:cNvPr id="26" name="Rechteck 25">
-            <a:extLst>
-              <a:ext uri="{FF2B5EF4-FFF2-40B4-BE49-F238E27FC236}">
-                <a16:creationId xmlns:a16="http://schemas.microsoft.com/office/drawing/2014/main" id="{E00EB115-200D-4F3F-A34A-40610FB695D9}"/>
+          <p:cNvPr id="24" name="Rechteck 23">
+            <a:extLst>
+              <a:ext uri="{FF2B5EF4-FFF2-40B4-BE49-F238E27FC236}">
+                <a16:creationId xmlns:a16="http://schemas.microsoft.com/office/drawing/2014/main" id="{E0DD4C99-5764-4281-9FD5-0D2CCD3CC1A8}"/>
               </a:ext>
             </a:extLst>
           </p:cNvPr>
@@ -4210,8 +6915,8 @@
         </p:nvSpPr>
         <p:spPr>
           <a:xfrm>
-            <a:off x="8190669" y="2440714"/>
-            <a:ext cx="963497" cy="454886"/>
+            <a:off x="7314798" y="254087"/>
+            <a:ext cx="733032" cy="354121"/>
           </a:xfrm>
           <a:prstGeom prst="rect">
             <a:avLst/>
@@ -4220,6 +6925,264 @@
             <a:schemeClr val="accent6">
               <a:alpha val="25000"/>
             </a:schemeClr>
+          </a:solidFill>
+          <a:ln>
+            <a:noFill/>
+          </a:ln>
+        </p:spPr>
+        <p:style>
+          <a:lnRef idx="2">
+            <a:schemeClr val="accent6">
+              <a:shade val="50000"/>
+            </a:schemeClr>
+          </a:lnRef>
+          <a:fillRef idx="1">
+            <a:schemeClr val="accent6"/>
+          </a:fillRef>
+          <a:effectRef idx="0">
+            <a:schemeClr val="accent6"/>
+          </a:effectRef>
+          <a:fontRef idx="minor">
+            <a:schemeClr val="lt1"/>
+          </a:fontRef>
+        </p:style>
+        <p:txBody>
+          <a:bodyPr rtlCol="0" anchor="ctr"/>
+          <a:lstStyle/>
+          <a:p>
+            <a:pPr algn="ctr"/>
+            <a:endParaRPr lang="de-DE" dirty="0"/>
+          </a:p>
+        </p:txBody>
+      </p:sp>
+      <p:sp>
+        <p:nvSpPr>
+          <p:cNvPr id="27" name="Rechteck 26">
+            <a:extLst>
+              <a:ext uri="{FF2B5EF4-FFF2-40B4-BE49-F238E27FC236}">
+                <a16:creationId xmlns:a16="http://schemas.microsoft.com/office/drawing/2014/main" id="{6726D877-61BC-498C-B984-4290C6DF78F6}"/>
+              </a:ext>
+            </a:extLst>
+          </p:cNvPr>
+          <p:cNvSpPr/>
+          <p:nvPr/>
+        </p:nvSpPr>
+        <p:spPr>
+          <a:xfrm>
+            <a:off x="7314798" y="719325"/>
+            <a:ext cx="733032" cy="327919"/>
+          </a:xfrm>
+          <a:prstGeom prst="rect">
+            <a:avLst/>
+          </a:prstGeom>
+          <a:solidFill>
+            <a:srgbClr val="FFC000">
+              <a:alpha val="25000"/>
+            </a:srgbClr>
+          </a:solidFill>
+          <a:ln>
+            <a:noFill/>
+          </a:ln>
+        </p:spPr>
+        <p:style>
+          <a:lnRef idx="2">
+            <a:schemeClr val="accent6">
+              <a:shade val="50000"/>
+            </a:schemeClr>
+          </a:lnRef>
+          <a:fillRef idx="1">
+            <a:schemeClr val="accent6"/>
+          </a:fillRef>
+          <a:effectRef idx="0">
+            <a:schemeClr val="accent6"/>
+          </a:effectRef>
+          <a:fontRef idx="minor">
+            <a:schemeClr val="lt1"/>
+          </a:fontRef>
+        </p:style>
+        <p:txBody>
+          <a:bodyPr rtlCol="0" anchor="ctr"/>
+          <a:lstStyle/>
+          <a:p>
+            <a:pPr algn="ctr"/>
+            <a:endParaRPr lang="de-DE"/>
+          </a:p>
+        </p:txBody>
+      </p:sp>
+      <p:sp>
+        <p:nvSpPr>
+          <p:cNvPr id="2" name="Textfeld 1">
+            <a:extLst>
+              <a:ext uri="{FF2B5EF4-FFF2-40B4-BE49-F238E27FC236}">
+                <a16:creationId xmlns:a16="http://schemas.microsoft.com/office/drawing/2014/main" id="{2AF723A0-FC5E-4D17-A93C-11FFE8C6429A}"/>
+              </a:ext>
+            </a:extLst>
+          </p:cNvPr>
+          <p:cNvSpPr txBox="1"/>
+          <p:nvPr/>
+        </p:nvSpPr>
+        <p:spPr>
+          <a:xfrm>
+            <a:off x="8220063" y="702479"/>
+            <a:ext cx="2446504" cy="369332"/>
+          </a:xfrm>
+          <a:prstGeom prst="rect">
+            <a:avLst/>
+          </a:prstGeom>
+          <a:noFill/>
+        </p:spPr>
+        <p:txBody>
+          <a:bodyPr wrap="none" rtlCol="0">
+            <a:spAutoFit/>
+          </a:bodyPr>
+          <a:lstStyle/>
+          <a:p>
+            <a:r>
+              <a:rPr lang="de-DE" dirty="0" err="1"/>
+              <a:t>to</a:t>
+            </a:r>
+            <a:r>
+              <a:rPr lang="de-DE" dirty="0"/>
+              <a:t> </a:t>
+            </a:r>
+            <a:r>
+              <a:rPr lang="de-DE" dirty="0" err="1"/>
+              <a:t>be</a:t>
+            </a:r>
+            <a:r>
+              <a:rPr lang="de-DE" dirty="0"/>
+              <a:t> </a:t>
+            </a:r>
+            <a:r>
+              <a:rPr lang="de-DE" dirty="0" err="1"/>
+              <a:t>implemented</a:t>
+            </a:r>
+            <a:r>
+              <a:rPr lang="de-DE" dirty="0"/>
+              <a:t> </a:t>
+            </a:r>
+            <a:r>
+              <a:rPr lang="de-DE" dirty="0" err="1"/>
+              <a:t>next</a:t>
+            </a:r>
+            <a:endParaRPr lang="de-DE" dirty="0"/>
+          </a:p>
+        </p:txBody>
+      </p:sp>
+      <p:sp>
+        <p:nvSpPr>
+          <p:cNvPr id="28" name="Textfeld 27">
+            <a:extLst>
+              <a:ext uri="{FF2B5EF4-FFF2-40B4-BE49-F238E27FC236}">
+                <a16:creationId xmlns:a16="http://schemas.microsoft.com/office/drawing/2014/main" id="{A5EDBA9C-AE99-403F-829E-1255FD512F6C}"/>
+              </a:ext>
+            </a:extLst>
+          </p:cNvPr>
+          <p:cNvSpPr txBox="1"/>
+          <p:nvPr/>
+        </p:nvSpPr>
+        <p:spPr>
+          <a:xfrm>
+            <a:off x="8212052" y="254087"/>
+            <a:ext cx="1443216" cy="369332"/>
+          </a:xfrm>
+          <a:prstGeom prst="rect">
+            <a:avLst/>
+          </a:prstGeom>
+          <a:noFill/>
+        </p:spPr>
+        <p:txBody>
+          <a:bodyPr wrap="none" rtlCol="0">
+            <a:spAutoFit/>
+          </a:bodyPr>
+          <a:lstStyle/>
+          <a:p>
+            <a:r>
+              <a:rPr lang="de-DE" dirty="0" err="1"/>
+              <a:t>implemented</a:t>
+            </a:r>
+            <a:endParaRPr lang="de-DE" dirty="0"/>
+          </a:p>
+        </p:txBody>
+      </p:sp>
+      <p:sp>
+        <p:nvSpPr>
+          <p:cNvPr id="29" name="Rechteck 28">
+            <a:extLst>
+              <a:ext uri="{FF2B5EF4-FFF2-40B4-BE49-F238E27FC236}">
+                <a16:creationId xmlns:a16="http://schemas.microsoft.com/office/drawing/2014/main" id="{C1230F7A-B6D1-4588-8FF3-50A9156C05A0}"/>
+              </a:ext>
+            </a:extLst>
+          </p:cNvPr>
+          <p:cNvSpPr/>
+          <p:nvPr/>
+        </p:nvSpPr>
+        <p:spPr>
+          <a:xfrm>
+            <a:off x="9990497" y="5796503"/>
+            <a:ext cx="841966" cy="327919"/>
+          </a:xfrm>
+          <a:prstGeom prst="rect">
+            <a:avLst/>
+          </a:prstGeom>
+          <a:solidFill>
+            <a:srgbClr val="FFC000">
+              <a:alpha val="25000"/>
+            </a:srgbClr>
+          </a:solidFill>
+          <a:ln>
+            <a:noFill/>
+          </a:ln>
+        </p:spPr>
+        <p:style>
+          <a:lnRef idx="2">
+            <a:schemeClr val="accent6">
+              <a:shade val="50000"/>
+            </a:schemeClr>
+          </a:lnRef>
+          <a:fillRef idx="1">
+            <a:schemeClr val="accent6"/>
+          </a:fillRef>
+          <a:effectRef idx="0">
+            <a:schemeClr val="accent6"/>
+          </a:effectRef>
+          <a:fontRef idx="minor">
+            <a:schemeClr val="lt1"/>
+          </a:fontRef>
+        </p:style>
+        <p:txBody>
+          <a:bodyPr rtlCol="0" anchor="ctr"/>
+          <a:lstStyle/>
+          <a:p>
+            <a:pPr algn="ctr"/>
+            <a:endParaRPr lang="de-DE"/>
+          </a:p>
+        </p:txBody>
+      </p:sp>
+      <p:sp>
+        <p:nvSpPr>
+          <p:cNvPr id="30" name="Rechteck 29">
+            <a:extLst>
+              <a:ext uri="{FF2B5EF4-FFF2-40B4-BE49-F238E27FC236}">
+                <a16:creationId xmlns:a16="http://schemas.microsoft.com/office/drawing/2014/main" id="{99C5B0BF-2C04-472F-9DA3-54F376A08094}"/>
+              </a:ext>
+            </a:extLst>
+          </p:cNvPr>
+          <p:cNvSpPr/>
+          <p:nvPr/>
+        </p:nvSpPr>
+        <p:spPr>
+          <a:xfrm>
+            <a:off x="9990497" y="5098852"/>
+            <a:ext cx="841966" cy="327919"/>
+          </a:xfrm>
+          <a:prstGeom prst="rect">
+            <a:avLst/>
+          </a:prstGeom>
+          <a:solidFill>
+            <a:srgbClr val="FFC000">
+              <a:alpha val="25000"/>
+            </a:srgbClr>
           </a:solidFill>
           <a:ln>
             <a:noFill/>

</xml_diff>